<commit_message>
add new .pptx file
</commit_message>
<xml_diff>
--- a/docs/Analization of 'Smart Meters in London'.pptx
+++ b/docs/Analization of 'Smart Meters in London'.pptx
@@ -2,20 +2,22 @@
 <file path=ppt/presentation.xml><?xml version="1.0" encoding="utf-8"?>
 <p:presentation xmlns:a="http://schemas.openxmlformats.org/drawingml/2006/main" xmlns:r="http://schemas.openxmlformats.org/officeDocument/2006/relationships" xmlns:p="http://schemas.openxmlformats.org/presentationml/2006/main" saveSubsetFonts="1">
   <p:sldMasterIdLst>
-    <p:sldMasterId id="2147483686" r:id="rId1"/>
+    <p:sldMasterId id="2147483686" r:id="rId4"/>
   </p:sldMasterIdLst>
   <p:notesMasterIdLst>
-    <p:notesMasterId r:id="rId10"/>
+    <p:notesMasterId r:id="rId15"/>
   </p:notesMasterIdLst>
   <p:sldIdLst>
-    <p:sldId id="256" r:id="rId2"/>
-    <p:sldId id="257" r:id="rId3"/>
-    <p:sldId id="258" r:id="rId4"/>
-    <p:sldId id="259" r:id="rId5"/>
-    <p:sldId id="260" r:id="rId6"/>
-    <p:sldId id="261" r:id="rId7"/>
-    <p:sldId id="262" r:id="rId8"/>
-    <p:sldId id="263" r:id="rId9"/>
+    <p:sldId id="256" r:id="rId5"/>
+    <p:sldId id="257" r:id="rId6"/>
+    <p:sldId id="258" r:id="rId7"/>
+    <p:sldId id="259" r:id="rId8"/>
+    <p:sldId id="260" r:id="rId9"/>
+    <p:sldId id="261" r:id="rId10"/>
+    <p:sldId id="262" r:id="rId11"/>
+    <p:sldId id="265" r:id="rId12"/>
+    <p:sldId id="263" r:id="rId13"/>
+    <p:sldId id="264" r:id="rId14"/>
   </p:sldIdLst>
   <p:sldSz cx="12192000" cy="6858000"/>
   <p:notesSz cx="6858000" cy="9144000"/>
@@ -114,7 +116,22 @@
       </a:defRPr>
     </a:lvl9pPr>
   </p:defaultTextStyle>
+  <p:extLst>
+    <p:ext uri="{EFAFB233-063F-42B5-8137-9DF3F51BA10A}">
+      <p15:sldGuideLst xmlns:p15="http://schemas.microsoft.com/office/powerpoint/2012/main"/>
+    </p:ext>
+  </p:extLst>
 </p:presentation>
+</file>
+
+<file path=ppt/revisionInfo.xml><?xml version="1.0" encoding="utf-8"?>
+<p1510:revInfo xmlns:a="http://schemas.openxmlformats.org/drawingml/2006/main" xmlns:r="http://schemas.openxmlformats.org/officeDocument/2006/relationships" xmlns:p1510="http://schemas.microsoft.com/office/powerpoint/2015/10/main">
+  <p1510:revLst>
+    <p1510:client id="{C46C5BD8-13B5-23B7-46D7-9D5733844551}" v="4" dt="2025-06-10T12:20:21.832"/>
+    <p1510:client id="{D7579EC2-1CF3-47A6-9465-6740C6D38C8C}" v="1467" dt="2025-06-10T11:45:39.651"/>
+    <p1510:client id="{D79DB311-F712-C180-40BB-3D3D6154A3F5}" v="76" dt="2025-06-10T11:48:11.182"/>
+  </p1510:revLst>
+</p1510:revInfo>
 </file>
 
 <file path=ppt/notesMasters/notesMaster1.xml><?xml version="1.0" encoding="utf-8"?>
@@ -511,7 +528,7 @@
           <a:bodyPr/>
           <a:lstStyle/>
           <a:p>
-            <a:endParaRPr lang="ru-RU" dirty="0"/>
+            <a:endParaRPr lang="ru-RU"/>
           </a:p>
         </p:txBody>
       </p:sp>
@@ -542,6 +559,90 @@
     <p:extLst>
       <p:ext uri="{BB962C8B-B14F-4D97-AF65-F5344CB8AC3E}">
         <p14:creationId xmlns:p14="http://schemas.microsoft.com/office/powerpoint/2010/main" val="89764263"/>
+      </p:ext>
+    </p:extLst>
+  </p:cSld>
+  <p:clrMapOvr>
+    <a:masterClrMapping/>
+  </p:clrMapOvr>
+</p:notes>
+</file>
+
+<file path=ppt/notesSlides/notesSlide2.xml><?xml version="1.0" encoding="utf-8"?>
+<p:notes xmlns:a="http://schemas.openxmlformats.org/drawingml/2006/main" xmlns:r="http://schemas.openxmlformats.org/officeDocument/2006/relationships" xmlns:p="http://schemas.openxmlformats.org/presentationml/2006/main">
+  <p:cSld>
+    <p:spTree>
+      <p:nvGrpSpPr>
+        <p:cNvPr id="1" name=""/>
+        <p:cNvGrpSpPr/>
+        <p:nvPr/>
+      </p:nvGrpSpPr>
+      <p:grpSpPr>
+        <a:xfrm>
+          <a:off x="0" y="0"/>
+          <a:ext cx="0" cy="0"/>
+          <a:chOff x="0" y="0"/>
+          <a:chExt cx="0" cy="0"/>
+        </a:xfrm>
+      </p:grpSpPr>
+      <p:sp>
+        <p:nvSpPr>
+          <p:cNvPr id="2" name="Slide Image Placeholder 1"/>
+          <p:cNvSpPr>
+            <a:spLocks noGrp="1" noRot="1" noChangeAspect="1"/>
+          </p:cNvSpPr>
+          <p:nvPr>
+            <p:ph type="sldImg"/>
+          </p:nvPr>
+        </p:nvSpPr>
+        <p:spPr/>
+      </p:sp>
+      <p:sp>
+        <p:nvSpPr>
+          <p:cNvPr id="3" name="Notes Placeholder 2"/>
+          <p:cNvSpPr>
+            <a:spLocks noGrp="1"/>
+          </p:cNvSpPr>
+          <p:nvPr>
+            <p:ph type="body" idx="1"/>
+          </p:nvPr>
+        </p:nvSpPr>
+        <p:spPr/>
+        <p:txBody>
+          <a:bodyPr/>
+          <a:lstStyle/>
+          <a:p>
+            <a:endParaRPr lang="ru-RU"/>
+          </a:p>
+        </p:txBody>
+      </p:sp>
+      <p:sp>
+        <p:nvSpPr>
+          <p:cNvPr id="4" name="Slide Number Placeholder 3"/>
+          <p:cNvSpPr>
+            <a:spLocks noGrp="1"/>
+          </p:cNvSpPr>
+          <p:nvPr>
+            <p:ph type="sldNum" sz="quarter" idx="5"/>
+          </p:nvPr>
+        </p:nvSpPr>
+        <p:spPr/>
+        <p:txBody>
+          <a:bodyPr/>
+          <a:lstStyle/>
+          <a:p>
+            <a:fld id="{3A2BA00B-FB5B-454B-AEF4-F58AD16DD7AB}" type="slidenum">
+              <a:rPr lang="ru-RU" smtClean="0"/>
+              <a:t>4</a:t>
+            </a:fld>
+            <a:endParaRPr lang="ru-RU"/>
+          </a:p>
+        </p:txBody>
+      </p:sp>
+    </p:spTree>
+    <p:extLst>
+      <p:ext uri="{BB962C8B-B14F-4D97-AF65-F5344CB8AC3E}">
+        <p14:creationId xmlns:p14="http://schemas.microsoft.com/office/powerpoint/2010/main" val="3532642234"/>
       </p:ext>
     </p:extLst>
   </p:cSld>
@@ -733,7 +834,7 @@
           </a:lstStyle>
           <a:p>
             <a:r>
-              <a:rPr lang="en-US" dirty="0"/>
+              <a:rPr lang="en-US"/>
               <a:t>Click to edit Master title style</a:t>
             </a:r>
           </a:p>
@@ -1149,7 +1250,7 @@
           <a:lstStyle/>
           <a:p>
             <a:r>
-              <a:rPr lang="en-US" dirty="0"/>
+              <a:rPr lang="en-US"/>
               <a:t>Click to edit Master title style</a:t>
             </a:r>
           </a:p>
@@ -1183,35 +1284,35 @@
           <a:p>
             <a:pPr lvl="0"/>
             <a:r>
-              <a:rPr lang="en-US" dirty="0"/>
+              <a:rPr lang="en-US"/>
               <a:t>Click to edit Master text styles</a:t>
             </a:r>
           </a:p>
           <a:p>
             <a:pPr lvl="1"/>
             <a:r>
-              <a:rPr lang="en-US" dirty="0"/>
+              <a:rPr lang="en-US"/>
               <a:t>Second level</a:t>
             </a:r>
           </a:p>
           <a:p>
             <a:pPr lvl="2"/>
             <a:r>
-              <a:rPr lang="en-US" dirty="0"/>
+              <a:rPr lang="en-US"/>
               <a:t>Third level</a:t>
             </a:r>
           </a:p>
           <a:p>
             <a:pPr lvl="3"/>
             <a:r>
-              <a:rPr lang="en-US" dirty="0"/>
+              <a:rPr lang="en-US"/>
               <a:t>Fourth level</a:t>
             </a:r>
           </a:p>
           <a:p>
             <a:pPr lvl="4"/>
             <a:r>
-              <a:rPr lang="en-US" dirty="0"/>
+              <a:rPr lang="en-US"/>
               <a:t>Fifth level</a:t>
             </a:r>
           </a:p>
@@ -1613,7 +1714,7 @@
           </a:lstStyle>
           <a:p>
             <a:r>
-              <a:rPr lang="en-US" dirty="0"/>
+              <a:rPr lang="en-US"/>
               <a:t>Click to edit Master title style</a:t>
             </a:r>
           </a:p>
@@ -1740,7 +1841,7 @@
           <a:p>
             <a:pPr lvl="0"/>
             <a:r>
-              <a:rPr lang="en-US" dirty="0"/>
+              <a:rPr lang="en-US"/>
               <a:t>Click to edit Master text styles</a:t>
             </a:r>
           </a:p>
@@ -1933,7 +2034,7 @@
           <a:lstStyle/>
           <a:p>
             <a:r>
-              <a:rPr lang="en-US" dirty="0"/>
+              <a:rPr lang="en-US"/>
               <a:t>Click to edit Master title style</a:t>
             </a:r>
           </a:p>
@@ -2276,7 +2377,7 @@
           <a:p>
             <a:pPr lvl="0"/>
             <a:r>
-              <a:rPr lang="en-US" dirty="0"/>
+              <a:rPr lang="en-US"/>
               <a:t>Click to edit Master text styles</a:t>
             </a:r>
           </a:p>
@@ -2310,35 +2411,35 @@
           <a:p>
             <a:pPr lvl="0"/>
             <a:r>
-              <a:rPr lang="en-US" dirty="0"/>
+              <a:rPr lang="en-US"/>
               <a:t>Click to edit Master text styles</a:t>
             </a:r>
           </a:p>
           <a:p>
             <a:pPr lvl="1"/>
             <a:r>
-              <a:rPr lang="en-US" dirty="0"/>
+              <a:rPr lang="en-US"/>
               <a:t>Second level</a:t>
             </a:r>
           </a:p>
           <a:p>
             <a:pPr lvl="2"/>
             <a:r>
-              <a:rPr lang="en-US" dirty="0"/>
+              <a:rPr lang="en-US"/>
               <a:t>Third level</a:t>
             </a:r>
           </a:p>
           <a:p>
             <a:pPr lvl="3"/>
             <a:r>
-              <a:rPr lang="en-US" dirty="0"/>
+              <a:rPr lang="en-US"/>
               <a:t>Fourth level</a:t>
             </a:r>
           </a:p>
           <a:p>
             <a:pPr lvl="4"/>
             <a:r>
-              <a:rPr lang="en-US" dirty="0"/>
+              <a:rPr lang="en-US"/>
               <a:t>Fifth level</a:t>
             </a:r>
           </a:p>
@@ -2411,7 +2512,7 @@
           <a:p>
             <a:pPr lvl="0"/>
             <a:r>
-              <a:rPr lang="en-US" dirty="0"/>
+              <a:rPr lang="en-US"/>
               <a:t>Click to edit Master text styles</a:t>
             </a:r>
           </a:p>
@@ -2445,35 +2546,35 @@
           <a:p>
             <a:pPr lvl="0"/>
             <a:r>
-              <a:rPr lang="en-US" dirty="0"/>
+              <a:rPr lang="en-US"/>
               <a:t>Click to edit Master text styles</a:t>
             </a:r>
           </a:p>
           <a:p>
             <a:pPr lvl="1"/>
             <a:r>
-              <a:rPr lang="en-US" dirty="0"/>
+              <a:rPr lang="en-US"/>
               <a:t>Second level</a:t>
             </a:r>
           </a:p>
           <a:p>
             <a:pPr lvl="2"/>
             <a:r>
-              <a:rPr lang="en-US" dirty="0"/>
+              <a:rPr lang="en-US"/>
               <a:t>Third level</a:t>
             </a:r>
           </a:p>
           <a:p>
             <a:pPr lvl="3"/>
             <a:r>
-              <a:rPr lang="en-US" dirty="0"/>
+              <a:rPr lang="en-US"/>
               <a:t>Fourth level</a:t>
             </a:r>
           </a:p>
           <a:p>
             <a:pPr lvl="4"/>
             <a:r>
-              <a:rPr lang="en-US" dirty="0"/>
+              <a:rPr lang="en-US"/>
               <a:t>Fifth level</a:t>
             </a:r>
           </a:p>
@@ -2614,7 +2715,7 @@
           <a:lstStyle/>
           <a:p>
             <a:r>
-              <a:rPr lang="en-US" dirty="0"/>
+              <a:rPr lang="en-US"/>
               <a:t>Click to edit Master title style</a:t>
             </a:r>
           </a:p>
@@ -2879,7 +2980,7 @@
           </a:lstStyle>
           <a:p>
             <a:r>
-              <a:rPr lang="en-US" dirty="0"/>
+              <a:rPr lang="en-US"/>
               <a:t>Click to edit Master title style</a:t>
             </a:r>
           </a:p>
@@ -2943,35 +3044,35 @@
           <a:p>
             <a:pPr lvl="0"/>
             <a:r>
-              <a:rPr lang="en-US" dirty="0"/>
+              <a:rPr lang="en-US"/>
               <a:t>Click to edit Master text styles</a:t>
             </a:r>
           </a:p>
           <a:p>
             <a:pPr lvl="1"/>
             <a:r>
-              <a:rPr lang="en-US" dirty="0"/>
+              <a:rPr lang="en-US"/>
               <a:t>Second level</a:t>
             </a:r>
           </a:p>
           <a:p>
             <a:pPr lvl="2"/>
             <a:r>
-              <a:rPr lang="en-US" dirty="0"/>
+              <a:rPr lang="en-US"/>
               <a:t>Third level</a:t>
             </a:r>
           </a:p>
           <a:p>
             <a:pPr lvl="3"/>
             <a:r>
-              <a:rPr lang="en-US" dirty="0"/>
+              <a:rPr lang="en-US"/>
               <a:t>Fourth level</a:t>
             </a:r>
           </a:p>
           <a:p>
             <a:pPr lvl="4"/>
             <a:r>
-              <a:rPr lang="en-US" dirty="0"/>
+              <a:rPr lang="en-US"/>
               <a:t>Fifth level</a:t>
             </a:r>
           </a:p>
@@ -3196,7 +3297,7 @@
           </a:lstStyle>
           <a:p>
             <a:r>
-              <a:rPr lang="en-US" dirty="0"/>
+              <a:rPr lang="en-US"/>
               <a:t>Click to edit Master title style</a:t>
             </a:r>
           </a:p>
@@ -3492,7 +3593,7 @@
           <a:lstStyle/>
           <a:p>
             <a:r>
-              <a:rPr lang="en-US" dirty="0"/>
+              <a:rPr lang="en-US"/>
               <a:t>Click to edit Master title style</a:t>
             </a:r>
           </a:p>
@@ -3531,35 +3632,35 @@
           <a:p>
             <a:pPr lvl="0"/>
             <a:r>
-              <a:rPr lang="en-US" dirty="0"/>
+              <a:rPr lang="en-US"/>
               <a:t>Click to edit Master text styles</a:t>
             </a:r>
           </a:p>
           <a:p>
             <a:pPr lvl="1"/>
             <a:r>
-              <a:rPr lang="en-US" dirty="0"/>
+              <a:rPr lang="en-US"/>
               <a:t>Second level</a:t>
             </a:r>
           </a:p>
           <a:p>
             <a:pPr lvl="2"/>
             <a:r>
-              <a:rPr lang="en-US" dirty="0"/>
+              <a:rPr lang="en-US"/>
               <a:t>Third level</a:t>
             </a:r>
           </a:p>
           <a:p>
             <a:pPr lvl="3"/>
             <a:r>
-              <a:rPr lang="en-US" dirty="0"/>
+              <a:rPr lang="en-US"/>
               <a:t>Fourth level</a:t>
             </a:r>
           </a:p>
           <a:p>
             <a:pPr lvl="4"/>
             <a:r>
-              <a:rPr lang="en-US" dirty="0"/>
+              <a:rPr lang="en-US"/>
               <a:t>Fifth level</a:t>
             </a:r>
           </a:p>
@@ -3648,7 +3749,7 @@
             </a:lvl1pPr>
           </a:lstStyle>
           <a:p>
-            <a:endParaRPr lang="en-US" dirty="0"/>
+            <a:endParaRPr lang="en-US"/>
           </a:p>
         </p:txBody>
       </p:sp>
@@ -4406,14 +4507,10 @@
           <a:lstStyle/>
           <a:p>
             <a:r>
-              <a:rPr lang="en-US" sz="6600" dirty="0" err="1"/>
-              <a:t>Analization</a:t>
-            </a:r>
-            <a:r>
-              <a:rPr lang="en-US" sz="6600" dirty="0"/>
-              <a:t> of 'Smart Meters in London'</a:t>
-            </a:r>
-            <a:endParaRPr lang="ru-RU" sz="6600" dirty="0"/>
+              <a:rPr lang="en-US" sz="6600"/>
+              <a:t>Analyzation of 'Smart Meters in London'</a:t>
+            </a:r>
+            <a:endParaRPr lang="ru-RU" sz="6600"/>
           </a:p>
         </p:txBody>
       </p:sp>
@@ -4446,7 +4543,7 @@
           <a:lstStyle/>
           <a:p>
             <a:r>
-              <a:rPr lang="en-US" sz="2400" dirty="0"/>
+              <a:rPr lang="en-US" sz="2400"/>
               <a:t>Authors: </a:t>
             </a:r>
           </a:p>
@@ -4456,7 +4553,7 @@
               <a:buChar char="•"/>
             </a:pPr>
             <a:r>
-              <a:rPr lang="en-US" sz="2400" dirty="0"/>
+              <a:rPr lang="en-US" sz="2400"/>
               <a:t>Shevchenko Denys </a:t>
             </a:r>
           </a:p>
@@ -4466,18 +4563,10 @@
               <a:buChar char="•"/>
             </a:pPr>
             <a:r>
-              <a:rPr lang="en-US" sz="2400" dirty="0" err="1"/>
-              <a:t>Karabanov</a:t>
-            </a:r>
-            <a:r>
-              <a:rPr lang="en-US" sz="2400" dirty="0"/>
-              <a:t> </a:t>
-            </a:r>
-            <a:r>
-              <a:rPr lang="en-US" sz="2400" dirty="0" err="1"/>
-              <a:t>Yehor</a:t>
-            </a:r>
-            <a:endParaRPr lang="ru-RU" sz="2400" dirty="0"/>
+              <a:rPr lang="en-US" sz="2400"/>
+              <a:t>Karabanov Yehor</a:t>
+            </a:r>
+            <a:endParaRPr lang="ru-RU" sz="2400"/>
           </a:p>
         </p:txBody>
       </p:sp>
@@ -4573,6 +4662,71 @@
           </a:p>
         </p:txBody>
       </p:sp>
+      <p:sp>
+        <p:nvSpPr>
+          <p:cNvPr id="6" name="TextBox 5">
+            <a:extLst>
+              <a:ext uri="{FF2B5EF4-FFF2-40B4-BE49-F238E27FC236}">
+                <a16:creationId xmlns:a16="http://schemas.microsoft.com/office/drawing/2014/main" id="{A6658351-CF1F-BABE-E5A5-B73DA94F2298}"/>
+              </a:ext>
+            </a:extLst>
+          </p:cNvPr>
+          <p:cNvSpPr txBox="1"/>
+          <p:nvPr/>
+        </p:nvSpPr>
+        <p:spPr>
+          <a:xfrm>
+            <a:off x="8201666" y="6488658"/>
+            <a:ext cx="3990314" cy="369332"/>
+          </a:xfrm>
+          <a:prstGeom prst="rect">
+            <a:avLst/>
+          </a:prstGeom>
+          <a:noFill/>
+        </p:spPr>
+        <p:txBody>
+          <a:bodyPr wrap="square">
+            <a:spAutoFit/>
+          </a:bodyPr>
+          <a:lstStyle/>
+          <a:p>
+            <a:r>
+              <a:rPr lang="ru-RU"/>
+              <a:t>https://github.com/LilConsul/PyEEPro</a:t>
+            </a:r>
+          </a:p>
+        </p:txBody>
+      </p:sp>
+      <p:pic>
+        <p:nvPicPr>
+          <p:cNvPr id="4" name="Picture 3">
+            <a:extLst>
+              <a:ext uri="{FF2B5EF4-FFF2-40B4-BE49-F238E27FC236}">
+                <a16:creationId xmlns:a16="http://schemas.microsoft.com/office/drawing/2014/main" id="{EA5A0C11-44C9-253B-4085-6BFE96F4D1A8}"/>
+              </a:ext>
+            </a:extLst>
+          </p:cNvPr>
+          <p:cNvPicPr>
+            <a:picLocks noChangeAspect="1"/>
+          </p:cNvPicPr>
+          <p:nvPr/>
+        </p:nvPicPr>
+        <p:blipFill>
+          <a:blip r:embed="rId4"/>
+          <a:stretch>
+            <a:fillRect/>
+          </a:stretch>
+        </p:blipFill>
+        <p:spPr>
+          <a:xfrm>
+            <a:off x="8995627" y="3973974"/>
+            <a:ext cx="2418770" cy="2392102"/>
+          </a:xfrm>
+          <a:prstGeom prst="rect">
+            <a:avLst/>
+          </a:prstGeom>
+        </p:spPr>
+      </p:pic>
     </p:spTree>
     <p:extLst>
       <p:ext uri="{BB962C8B-B14F-4D97-AF65-F5344CB8AC3E}">
@@ -4586,9 +4740,17 @@
 </p:sld>
 </file>
 
-<file path=ppt/slides/slide2.xml><?xml version="1.0" encoding="utf-8"?>
+<file path=ppt/slides/slide10.xml><?xml version="1.0" encoding="utf-8"?>
 <p:sld xmlns:a="http://schemas.openxmlformats.org/drawingml/2006/main" xmlns:r="http://schemas.openxmlformats.org/officeDocument/2006/relationships" xmlns:p="http://schemas.openxmlformats.org/presentationml/2006/main">
   <p:cSld>
+    <p:bg>
+      <p:bgPr>
+        <a:solidFill>
+          <a:schemeClr val="bg1"/>
+        </a:solidFill>
+        <a:effectLst/>
+      </p:bgPr>
+    </p:bg>
     <p:spTree>
       <p:nvGrpSpPr>
         <p:cNvPr id="1" name=""/>
@@ -4603,11 +4765,529 @@
           <a:chExt cx="0" cy="0"/>
         </a:xfrm>
       </p:grpSpPr>
+      <p:sp useBgFill="1">
+        <p:nvSpPr>
+          <p:cNvPr id="31" name="Rectangle 30">
+            <a:extLst>
+              <a:ext uri="{FF2B5EF4-FFF2-40B4-BE49-F238E27FC236}">
+                <a16:creationId xmlns:a16="http://schemas.microsoft.com/office/drawing/2014/main" id="{CEDBC09E-10FE-C48A-8AE5-2DE3D7D705D6}"/>
+              </a:ext>
+              <a:ext uri="{C183D7F6-B498-43B3-948B-1728B52AA6E4}">
+                <adec:decorative xmlns:adec="http://schemas.microsoft.com/office/drawing/2017/decorative" val="1"/>
+              </a:ext>
+            </a:extLst>
+          </p:cNvPr>
+          <p:cNvSpPr>
+            <a:spLocks noGrp="1" noRot="1" noChangeAspect="1" noMove="1" noResize="1" noEditPoints="1" noAdjustHandles="1" noChangeArrowheads="1" noChangeShapeType="1" noTextEdit="1"/>
+          </p:cNvSpPr>
+          <p:nvPr>
+            <p:extLst>
+              <p:ext uri="{386F3935-93C4-4BCD-93E2-E3B085C9AB24}">
+                <p16:designElem xmlns:p16="http://schemas.microsoft.com/office/powerpoint/2015/main" val="1"/>
+              </p:ext>
+            </p:extLst>
+          </p:nvPr>
+        </p:nvSpPr>
+        <p:spPr>
+          <a:xfrm>
+            <a:off x="0" y="0"/>
+            <a:ext cx="12192000" cy="6858001"/>
+          </a:xfrm>
+          <a:prstGeom prst="rect">
+            <a:avLst/>
+          </a:prstGeom>
+          <a:ln>
+            <a:noFill/>
+          </a:ln>
+        </p:spPr>
+        <p:style>
+          <a:lnRef idx="2">
+            <a:schemeClr val="accent1">
+              <a:shade val="50000"/>
+            </a:schemeClr>
+          </a:lnRef>
+          <a:fillRef idx="1">
+            <a:schemeClr val="accent1"/>
+          </a:fillRef>
+          <a:effectRef idx="0">
+            <a:schemeClr val="accent1"/>
+          </a:effectRef>
+          <a:fontRef idx="minor">
+            <a:schemeClr val="lt1"/>
+          </a:fontRef>
+        </p:style>
+        <p:txBody>
+          <a:bodyPr rtlCol="0" anchor="ctr"/>
+          <a:lstStyle/>
+          <a:p>
+            <a:pPr algn="ctr"/>
+            <a:endParaRPr lang="en-US"/>
+          </a:p>
+        </p:txBody>
+      </p:sp>
       <p:sp>
         <p:nvSpPr>
           <p:cNvPr id="2" name="Title 1">
             <a:extLst>
               <a:ext uri="{FF2B5EF4-FFF2-40B4-BE49-F238E27FC236}">
+                <a16:creationId xmlns:a16="http://schemas.microsoft.com/office/drawing/2014/main" id="{B33218C5-25F6-670F-5D4D-4BC78DD5788E}"/>
+              </a:ext>
+            </a:extLst>
+          </p:cNvPr>
+          <p:cNvSpPr>
+            <a:spLocks noGrp="1"/>
+          </p:cNvSpPr>
+          <p:nvPr>
+            <p:ph type="ctrTitle"/>
+          </p:nvPr>
+        </p:nvSpPr>
+        <p:spPr>
+          <a:xfrm>
+            <a:off x="517870" y="978408"/>
+            <a:ext cx="6117661" cy="3290123"/>
+          </a:xfrm>
+        </p:spPr>
+        <p:txBody>
+          <a:bodyPr anchor="t">
+            <a:normAutofit/>
+          </a:bodyPr>
+          <a:lstStyle/>
+          <a:p>
+            <a:r>
+              <a:rPr lang="en-US" sz="6600"/>
+              <a:t>Thanks for your time</a:t>
+            </a:r>
+            <a:endParaRPr lang="ru-RU" sz="6600"/>
+          </a:p>
+        </p:txBody>
+      </p:sp>
+      <p:sp>
+        <p:nvSpPr>
+          <p:cNvPr id="33" name="Rectangle 32">
+            <a:extLst>
+              <a:ext uri="{FF2B5EF4-FFF2-40B4-BE49-F238E27FC236}">
+                <a16:creationId xmlns:a16="http://schemas.microsoft.com/office/drawing/2014/main" id="{31EBD83C-D653-7B6E-791C-91DC49F82E50}"/>
+              </a:ext>
+              <a:ext uri="{C183D7F6-B498-43B3-948B-1728B52AA6E4}">
+                <adec:decorative xmlns:adec="http://schemas.microsoft.com/office/drawing/2017/decorative" val="1"/>
+              </a:ext>
+            </a:extLst>
+          </p:cNvPr>
+          <p:cNvSpPr>
+            <a:spLocks noGrp="1" noRot="1" noChangeAspect="1" noMove="1" noResize="1" noEditPoints="1" noAdjustHandles="1" noChangeArrowheads="1" noChangeShapeType="1" noTextEdit="1"/>
+          </p:cNvSpPr>
+          <p:nvPr>
+            <p:extLst>
+              <p:ext uri="{386F3935-93C4-4BCD-93E2-E3B085C9AB24}">
+                <p16:designElem xmlns:p16="http://schemas.microsoft.com/office/powerpoint/2015/main" val="1"/>
+              </p:ext>
+            </p:extLst>
+          </p:nvPr>
+        </p:nvSpPr>
+        <p:spPr>
+          <a:xfrm>
+            <a:off x="517870" y="508090"/>
+            <a:ext cx="6126480" cy="149279"/>
+          </a:xfrm>
+          <a:prstGeom prst="rect">
+            <a:avLst/>
+          </a:prstGeom>
+          <a:solidFill>
+            <a:schemeClr val="tx1"/>
+          </a:solidFill>
+          <a:ln>
+            <a:noFill/>
+          </a:ln>
+        </p:spPr>
+        <p:style>
+          <a:lnRef idx="2">
+            <a:schemeClr val="accent1">
+              <a:shade val="50000"/>
+            </a:schemeClr>
+          </a:lnRef>
+          <a:fillRef idx="1">
+            <a:schemeClr val="accent1"/>
+          </a:fillRef>
+          <a:effectRef idx="0">
+            <a:schemeClr val="accent1"/>
+          </a:effectRef>
+          <a:fontRef idx="minor">
+            <a:schemeClr val="lt1"/>
+          </a:fontRef>
+        </p:style>
+        <p:txBody>
+          <a:bodyPr rtlCol="0" anchor="ctr"/>
+          <a:lstStyle/>
+          <a:p>
+            <a:pPr algn="ctr"/>
+            <a:endParaRPr lang="en-US"/>
+          </a:p>
+        </p:txBody>
+      </p:sp>
+      <p:sp>
+        <p:nvSpPr>
+          <p:cNvPr id="35" name="Freeform: Shape 34">
+            <a:extLst>
+              <a:ext uri="{FF2B5EF4-FFF2-40B4-BE49-F238E27FC236}">
+                <a16:creationId xmlns:a16="http://schemas.microsoft.com/office/drawing/2014/main" id="{28B09CB6-CBCC-A221-E35E-4FA215926078}"/>
+              </a:ext>
+              <a:ext uri="{C183D7F6-B498-43B3-948B-1728B52AA6E4}">
+                <adec:decorative xmlns:adec="http://schemas.microsoft.com/office/drawing/2017/decorative" val="1"/>
+              </a:ext>
+            </a:extLst>
+          </p:cNvPr>
+          <p:cNvSpPr>
+            <a:spLocks noGrp="1" noRot="1" noChangeAspect="1" noMove="1" noResize="1" noEditPoints="1" noAdjustHandles="1" noChangeArrowheads="1" noChangeShapeType="1" noTextEdit="1"/>
+          </p:cNvSpPr>
+          <p:nvPr>
+            <p:extLst>
+              <p:ext uri="{386F3935-93C4-4BCD-93E2-E3B085C9AB24}">
+                <p16:designElem xmlns:p16="http://schemas.microsoft.com/office/powerpoint/2015/main" val="1"/>
+              </p:ext>
+            </p:extLst>
+          </p:nvPr>
+        </p:nvSpPr>
+        <p:spPr>
+          <a:xfrm>
+            <a:off x="581696" y="4617503"/>
+            <a:ext cx="6071583" cy="45719"/>
+          </a:xfrm>
+          <a:custGeom>
+            <a:avLst/>
+            <a:gdLst>
+              <a:gd name="connsiteX0" fmla="*/ 0 w 6071583"/>
+              <a:gd name="connsiteY0" fmla="*/ 0 h 45719"/>
+              <a:gd name="connsiteX1" fmla="*/ 3434358 w 6071583"/>
+              <a:gd name="connsiteY1" fmla="*/ 0 h 45719"/>
+              <a:gd name="connsiteX2" fmla="*/ 4667593 w 6071583"/>
+              <a:gd name="connsiteY2" fmla="*/ 0 h 45719"/>
+              <a:gd name="connsiteX3" fmla="*/ 6071583 w 6071583"/>
+              <a:gd name="connsiteY3" fmla="*/ 0 h 45719"/>
+              <a:gd name="connsiteX4" fmla="*/ 6071583 w 6071583"/>
+              <a:gd name="connsiteY4" fmla="*/ 45719 h 45719"/>
+              <a:gd name="connsiteX5" fmla="*/ 4667593 w 6071583"/>
+              <a:gd name="connsiteY5" fmla="*/ 45719 h 45719"/>
+              <a:gd name="connsiteX6" fmla="*/ 3434358 w 6071583"/>
+              <a:gd name="connsiteY6" fmla="*/ 45719 h 45719"/>
+              <a:gd name="connsiteX7" fmla="*/ 0 w 6071583"/>
+              <a:gd name="connsiteY7" fmla="*/ 45719 h 45719"/>
+            </a:gdLst>
+            <a:ahLst/>
+            <a:cxnLst>
+              <a:cxn ang="0">
+                <a:pos x="connsiteX0" y="connsiteY0"/>
+              </a:cxn>
+              <a:cxn ang="0">
+                <a:pos x="connsiteX1" y="connsiteY1"/>
+              </a:cxn>
+              <a:cxn ang="0">
+                <a:pos x="connsiteX2" y="connsiteY2"/>
+              </a:cxn>
+              <a:cxn ang="0">
+                <a:pos x="connsiteX3" y="connsiteY3"/>
+              </a:cxn>
+              <a:cxn ang="0">
+                <a:pos x="connsiteX4" y="connsiteY4"/>
+              </a:cxn>
+              <a:cxn ang="0">
+                <a:pos x="connsiteX5" y="connsiteY5"/>
+              </a:cxn>
+              <a:cxn ang="0">
+                <a:pos x="connsiteX6" y="connsiteY6"/>
+              </a:cxn>
+              <a:cxn ang="0">
+                <a:pos x="connsiteX7" y="connsiteY7"/>
+              </a:cxn>
+            </a:cxnLst>
+            <a:rect l="l" t="t" r="r" b="b"/>
+            <a:pathLst>
+              <a:path w="6071583" h="45719">
+                <a:moveTo>
+                  <a:pt x="0" y="0"/>
+                </a:moveTo>
+                <a:lnTo>
+                  <a:pt x="3434358" y="0"/>
+                </a:lnTo>
+                <a:lnTo>
+                  <a:pt x="4667593" y="0"/>
+                </a:lnTo>
+                <a:lnTo>
+                  <a:pt x="6071583" y="0"/>
+                </a:lnTo>
+                <a:lnTo>
+                  <a:pt x="6071583" y="45719"/>
+                </a:lnTo>
+                <a:lnTo>
+                  <a:pt x="4667593" y="45719"/>
+                </a:lnTo>
+                <a:lnTo>
+                  <a:pt x="3434358" y="45719"/>
+                </a:lnTo>
+                <a:lnTo>
+                  <a:pt x="0" y="45719"/>
+                </a:lnTo>
+                <a:close/>
+              </a:path>
+            </a:pathLst>
+          </a:custGeom>
+          <a:solidFill>
+            <a:schemeClr val="tx1"/>
+          </a:solidFill>
+          <a:ln>
+            <a:noFill/>
+          </a:ln>
+        </p:spPr>
+        <p:style>
+          <a:lnRef idx="2">
+            <a:schemeClr val="accent1">
+              <a:shade val="50000"/>
+            </a:schemeClr>
+          </a:lnRef>
+          <a:fillRef idx="1">
+            <a:schemeClr val="accent1"/>
+          </a:fillRef>
+          <a:effectRef idx="0">
+            <a:schemeClr val="accent1"/>
+          </a:effectRef>
+          <a:fontRef idx="minor">
+            <a:schemeClr val="lt1"/>
+          </a:fontRef>
+        </p:style>
+        <p:txBody>
+          <a:bodyPr wrap="square" rtlCol="0" anchor="ctr">
+            <a:noAutofit/>
+          </a:bodyPr>
+          <a:lstStyle/>
+          <a:p>
+            <a:pPr algn="ctr"/>
+            <a:endParaRPr lang="en-US"/>
+          </a:p>
+        </p:txBody>
+      </p:sp>
+      <p:pic>
+        <p:nvPicPr>
+          <p:cNvPr id="5" name="Picture 4">
+            <a:extLst>
+              <a:ext uri="{FF2B5EF4-FFF2-40B4-BE49-F238E27FC236}">
+                <a16:creationId xmlns:a16="http://schemas.microsoft.com/office/drawing/2014/main" id="{D940DA75-F3C6-F7C2-CA88-228AB65BA556}"/>
+              </a:ext>
+            </a:extLst>
+          </p:cNvPr>
+          <p:cNvPicPr>
+            <a:picLocks noChangeAspect="1"/>
+          </p:cNvPicPr>
+          <p:nvPr/>
+        </p:nvPicPr>
+        <p:blipFill>
+          <a:blip r:embed="rId2"/>
+          <a:stretch>
+            <a:fillRect/>
+          </a:stretch>
+        </p:blipFill>
+        <p:spPr>
+          <a:xfrm>
+            <a:off x="8943394" y="784855"/>
+            <a:ext cx="2038931" cy="2023639"/>
+          </a:xfrm>
+          <a:prstGeom prst="rect">
+            <a:avLst/>
+          </a:prstGeom>
+        </p:spPr>
+      </p:pic>
+      <p:sp>
+        <p:nvSpPr>
+          <p:cNvPr id="8" name="TextBox 7">
+            <a:extLst>
+              <a:ext uri="{FF2B5EF4-FFF2-40B4-BE49-F238E27FC236}">
+                <a16:creationId xmlns:a16="http://schemas.microsoft.com/office/drawing/2014/main" id="{7024403C-CD8D-6633-2CA0-C913D8B31024}"/>
+              </a:ext>
+            </a:extLst>
+          </p:cNvPr>
+          <p:cNvSpPr txBox="1"/>
+          <p:nvPr/>
+        </p:nvSpPr>
+        <p:spPr>
+          <a:xfrm>
+            <a:off x="581696" y="4883448"/>
+            <a:ext cx="6989536" cy="1754326"/>
+          </a:xfrm>
+          <a:prstGeom prst="rect">
+            <a:avLst/>
+          </a:prstGeom>
+          <a:noFill/>
+        </p:spPr>
+        <p:txBody>
+          <a:bodyPr wrap="square" rtlCol="0">
+            <a:spAutoFit/>
+          </a:bodyPr>
+          <a:lstStyle/>
+          <a:p>
+            <a:r>
+              <a:rPr lang="en-US"/>
+              <a:t>To see project description visit GitHub readme file: </a:t>
+            </a:r>
+            <a:r>
+              <a:rPr lang="en-US">
+                <a:solidFill>
+                  <a:schemeClr val="accent5"/>
+                </a:solidFill>
+                <a:hlinkClick r:id="rId3">
+                  <a:extLst>
+                    <a:ext uri="{A12FA001-AC4F-418D-AE19-62706E023703}">
+                      <ahyp:hlinkClr xmlns:ahyp="http://schemas.microsoft.com/office/drawing/2018/hyperlinkcolor" val="tx"/>
+                    </a:ext>
+                  </a:extLst>
+                </a:hlinkClick>
+              </a:rPr>
+              <a:t>https://github.com/LilConsul/PyEEPro</a:t>
+            </a:r>
+            <a:endParaRPr lang="en-US">
+              <a:solidFill>
+                <a:schemeClr val="accent5"/>
+              </a:solidFill>
+            </a:endParaRPr>
+          </a:p>
+          <a:p>
+            <a:endParaRPr lang="en-US">
+              <a:solidFill>
+                <a:schemeClr val="accent5"/>
+              </a:solidFill>
+            </a:endParaRPr>
+          </a:p>
+          <a:p>
+            <a:r>
+              <a:rPr lang="en-US"/>
+              <a:t>Report of the project is located inside of the ‘docs’ directory : </a:t>
+            </a:r>
+            <a:r>
+              <a:rPr lang="en-US">
+                <a:solidFill>
+                  <a:schemeClr val="accent5"/>
+                </a:solidFill>
+                <a:hlinkClick r:id="rId4">
+                  <a:extLst>
+                    <a:ext uri="{A12FA001-AC4F-418D-AE19-62706E023703}">
+                      <ahyp:hlinkClr xmlns:ahyp="http://schemas.microsoft.com/office/drawing/2018/hyperlinkcolor" val="tx"/>
+                    </a:ext>
+                  </a:extLst>
+                </a:hlinkClick>
+              </a:rPr>
+              <a:t>https://github.com/LilConsul/PyEEPro/blob/main/docs/REPORT.md</a:t>
+            </a:r>
+            <a:endParaRPr lang="en-US">
+              <a:solidFill>
+                <a:schemeClr val="accent5"/>
+              </a:solidFill>
+            </a:endParaRPr>
+          </a:p>
+          <a:p>
+            <a:endParaRPr lang="ru-RU"/>
+          </a:p>
+        </p:txBody>
+      </p:sp>
+    </p:spTree>
+    <p:extLst>
+      <p:ext uri="{BB962C8B-B14F-4D97-AF65-F5344CB8AC3E}">
+        <p14:creationId xmlns:p14="http://schemas.microsoft.com/office/powerpoint/2010/main" val="147845567"/>
+      </p:ext>
+    </p:extLst>
+  </p:cSld>
+  <p:clrMapOvr>
+    <a:masterClrMapping/>
+  </p:clrMapOvr>
+</p:sld>
+</file>
+
+<file path=ppt/slides/slide2.xml><?xml version="1.0" encoding="utf-8"?>
+<p:sld xmlns:a="http://schemas.openxmlformats.org/drawingml/2006/main" xmlns:r="http://schemas.openxmlformats.org/officeDocument/2006/relationships" xmlns:p="http://schemas.openxmlformats.org/presentationml/2006/main">
+  <p:cSld>
+    <p:bg>
+      <p:bgPr>
+        <a:solidFill>
+          <a:schemeClr val="bg1"/>
+        </a:solidFill>
+        <a:effectLst/>
+      </p:bgPr>
+    </p:bg>
+    <p:spTree>
+      <p:nvGrpSpPr>
+        <p:cNvPr id="1" name=""/>
+        <p:cNvGrpSpPr/>
+        <p:nvPr/>
+      </p:nvGrpSpPr>
+      <p:grpSpPr>
+        <a:xfrm>
+          <a:off x="0" y="0"/>
+          <a:ext cx="0" cy="0"/>
+          <a:chOff x="0" y="0"/>
+          <a:chExt cx="0" cy="0"/>
+        </a:xfrm>
+      </p:grpSpPr>
+      <p:sp useBgFill="1">
+        <p:nvSpPr>
+          <p:cNvPr id="43" name="Rectangle 42">
+            <a:extLst>
+              <a:ext uri="{FF2B5EF4-FFF2-40B4-BE49-F238E27FC236}">
+                <a16:creationId xmlns:a16="http://schemas.microsoft.com/office/drawing/2014/main" id="{34C0330F-1D4F-4552-B799-615DD237B6DE}"/>
+              </a:ext>
+              <a:ext uri="{C183D7F6-B498-43B3-948B-1728B52AA6E4}">
+                <adec:decorative xmlns:adec="http://schemas.microsoft.com/office/drawing/2017/decorative" val="1"/>
+              </a:ext>
+            </a:extLst>
+          </p:cNvPr>
+          <p:cNvSpPr>
+            <a:spLocks noGrp="1" noRot="1" noChangeAspect="1" noMove="1" noResize="1" noEditPoints="1" noAdjustHandles="1" noChangeArrowheads="1" noChangeShapeType="1" noTextEdit="1"/>
+          </p:cNvSpPr>
+          <p:nvPr>
+            <p:extLst>
+              <p:ext uri="{386F3935-93C4-4BCD-93E2-E3B085C9AB24}">
+                <p16:designElem xmlns:p16="http://schemas.microsoft.com/office/powerpoint/2015/main" val="1"/>
+              </p:ext>
+            </p:extLst>
+          </p:nvPr>
+        </p:nvSpPr>
+        <p:spPr>
+          <a:xfrm>
+            <a:off x="0" y="0"/>
+            <a:ext cx="12188952" cy="6857995"/>
+          </a:xfrm>
+          <a:prstGeom prst="rect">
+            <a:avLst/>
+          </a:prstGeom>
+          <a:ln>
+            <a:noFill/>
+          </a:ln>
+        </p:spPr>
+        <p:style>
+          <a:lnRef idx="2">
+            <a:schemeClr val="accent1">
+              <a:shade val="50000"/>
+            </a:schemeClr>
+          </a:lnRef>
+          <a:fillRef idx="1">
+            <a:schemeClr val="accent1"/>
+          </a:fillRef>
+          <a:effectRef idx="0">
+            <a:schemeClr val="accent1"/>
+          </a:effectRef>
+          <a:fontRef idx="minor">
+            <a:schemeClr val="lt1"/>
+          </a:fontRef>
+        </p:style>
+        <p:txBody>
+          <a:bodyPr rtlCol="0" anchor="ctr"/>
+          <a:lstStyle/>
+          <a:p>
+            <a:pPr algn="ctr"/>
+            <a:endParaRPr lang="en-US"/>
+          </a:p>
+        </p:txBody>
+      </p:sp>
+      <p:sp>
+        <p:nvSpPr>
+          <p:cNvPr id="2" name="Title 1">
+            <a:extLst>
+              <a:ext uri="{FF2B5EF4-FFF2-40B4-BE49-F238E27FC236}">
                 <a16:creationId xmlns:a16="http://schemas.microsoft.com/office/drawing/2014/main" id="{49656412-48CB-A679-2CCB-92904BA3E7C3}"/>
               </a:ext>
             </a:extLst>
@@ -4619,16 +5299,86 @@
             <p:ph type="title"/>
           </p:nvPr>
         </p:nvSpPr>
-        <p:spPr/>
-        <p:txBody>
-          <a:bodyPr/>
-          <a:lstStyle/>
-          <a:p>
-            <a:r>
-              <a:rPr lang="en-US" dirty="0"/>
-              <a:t>Project Overview</a:t>
-            </a:r>
-            <a:endParaRPr lang="ru-RU" dirty="0"/>
+        <p:spPr>
+          <a:xfrm>
+            <a:off x="521208" y="978408"/>
+            <a:ext cx="5020056" cy="1463040"/>
+          </a:xfrm>
+        </p:spPr>
+        <p:txBody>
+          <a:bodyPr>
+            <a:normAutofit/>
+          </a:bodyPr>
+          <a:lstStyle/>
+          <a:p>
+            <a:r>
+              <a:rPr lang="en-US"/>
+              <a:t>What We Built</a:t>
+            </a:r>
+            <a:endParaRPr lang="ru-RU"/>
+          </a:p>
+        </p:txBody>
+      </p:sp>
+      <p:sp>
+        <p:nvSpPr>
+          <p:cNvPr id="44" name="Rectangle 43">
+            <a:extLst>
+              <a:ext uri="{FF2B5EF4-FFF2-40B4-BE49-F238E27FC236}">
+                <a16:creationId xmlns:a16="http://schemas.microsoft.com/office/drawing/2014/main" id="{92BE0106-0C20-465B-A1BE-0BAC2737B1AD}"/>
+              </a:ext>
+              <a:ext uri="{C183D7F6-B498-43B3-948B-1728B52AA6E4}">
+                <adec:decorative xmlns:adec="http://schemas.microsoft.com/office/drawing/2017/decorative" val="1"/>
+              </a:ext>
+            </a:extLst>
+          </p:cNvPr>
+          <p:cNvSpPr>
+            <a:spLocks noGrp="1" noRot="1" noChangeAspect="1" noMove="1" noResize="1" noEditPoints="1" noAdjustHandles="1" noChangeArrowheads="1" noChangeShapeType="1" noTextEdit="1"/>
+          </p:cNvSpPr>
+          <p:nvPr>
+            <p:extLst>
+              <p:ext uri="{386F3935-93C4-4BCD-93E2-E3B085C9AB24}">
+                <p16:designElem xmlns:p16="http://schemas.microsoft.com/office/powerpoint/2015/main" val="1"/>
+              </p:ext>
+            </p:extLst>
+          </p:nvPr>
+        </p:nvSpPr>
+        <p:spPr>
+          <a:xfrm>
+            <a:off x="517870" y="508090"/>
+            <a:ext cx="5021183" cy="149279"/>
+          </a:xfrm>
+          <a:prstGeom prst="rect">
+            <a:avLst/>
+          </a:prstGeom>
+          <a:solidFill>
+            <a:schemeClr val="tx1"/>
+          </a:solidFill>
+          <a:ln>
+            <a:noFill/>
+          </a:ln>
+        </p:spPr>
+        <p:style>
+          <a:lnRef idx="2">
+            <a:schemeClr val="accent1">
+              <a:shade val="50000"/>
+            </a:schemeClr>
+          </a:lnRef>
+          <a:fillRef idx="1">
+            <a:schemeClr val="accent1"/>
+          </a:fillRef>
+          <a:effectRef idx="0">
+            <a:schemeClr val="accent1"/>
+          </a:effectRef>
+          <a:fontRef idx="minor">
+            <a:schemeClr val="lt1"/>
+          </a:fontRef>
+        </p:style>
+        <p:txBody>
+          <a:bodyPr rtlCol="0" anchor="ctr"/>
+          <a:lstStyle/>
+          <a:p>
+            <a:pPr algn="ctr"/>
+            <a:endParaRPr lang="en-US"/>
           </a:p>
         </p:txBody>
       </p:sp>
@@ -4648,49 +5398,93 @@
             <p:ph idx="1"/>
           </p:nvPr>
         </p:nvSpPr>
-        <p:spPr/>
-        <p:txBody>
-          <a:bodyPr/>
-          <a:lstStyle/>
-          <a:p>
-            <a:r>
-              <a:rPr lang="en-US" dirty="0"/>
-              <a:t>Interactive analytics dashboard analyzing the "Smart Meters in London" dataset</a:t>
-            </a:r>
-          </a:p>
-          <a:p>
-            <a:r>
-              <a:rPr lang="en-US" dirty="0"/>
-              <a:t>Objective: Extract actionable insights for energy providers, policymakers, and consumers</a:t>
-            </a:r>
-          </a:p>
-          <a:p>
-            <a:r>
-              <a:rPr lang="en-US" dirty="0"/>
-              <a:t>Comprehensive analysis of household energy consumption patterns in London</a:t>
-            </a:r>
-          </a:p>
-          <a:p>
-            <a:r>
-              <a:rPr lang="en-US" dirty="0"/>
-              <a:t>Built with high-performance data science tools: Polars, </a:t>
-            </a:r>
-            <a:r>
-              <a:rPr lang="en-US" dirty="0" err="1"/>
-              <a:t>Streamlit</a:t>
-            </a:r>
-            <a:r>
-              <a:rPr lang="en-US" dirty="0"/>
-              <a:t>, </a:t>
-            </a:r>
-            <a:r>
-              <a:rPr lang="en-US" dirty="0" err="1"/>
-              <a:t>PyTorch</a:t>
-            </a:r>
-            <a:endParaRPr lang="ru-RU" dirty="0"/>
-          </a:p>
-        </p:txBody>
-      </p:sp>
+        <p:spPr>
+          <a:xfrm>
+            <a:off x="521208" y="2578608"/>
+            <a:ext cx="5020056" cy="3767328"/>
+          </a:xfrm>
+        </p:spPr>
+        <p:txBody>
+          <a:bodyPr>
+            <a:normAutofit/>
+          </a:bodyPr>
+          <a:lstStyle/>
+          <a:p>
+            <a:r>
+              <a:rPr lang="en-US"/>
+              <a:t>We created an interactive dashboard that transforms London's smart meter data into actionable insights. Think of it as a detective tool for energy consumption – helping utility companies, city planners, and Londoners understand when, why, and how London uses electricity.</a:t>
+            </a:r>
+          </a:p>
+          <a:p>
+            <a:r>
+              <a:rPr lang="en-US"/>
+              <a:t>The dashboard reveals the rhythm of city life through energy patterns, turning millions of readings into stories that actually matter.</a:t>
+            </a:r>
+          </a:p>
+        </p:txBody>
+      </p:sp>
+      <p:pic>
+        <p:nvPicPr>
+          <p:cNvPr id="7" name="Picture 6">
+            <a:extLst>
+              <a:ext uri="{FF2B5EF4-FFF2-40B4-BE49-F238E27FC236}">
+                <a16:creationId xmlns:a16="http://schemas.microsoft.com/office/drawing/2014/main" id="{17858888-7CBB-33A4-A648-64173D07C8EF}"/>
+              </a:ext>
+            </a:extLst>
+          </p:cNvPr>
+          <p:cNvPicPr>
+            <a:picLocks noChangeAspect="1"/>
+          </p:cNvPicPr>
+          <p:nvPr/>
+        </p:nvPicPr>
+        <p:blipFill>
+          <a:blip r:embed="rId2"/>
+          <a:srcRect t="3394" r="1" b="1"/>
+          <a:stretch>
+            <a:fillRect/>
+          </a:stretch>
+        </p:blipFill>
+        <p:spPr>
+          <a:xfrm>
+            <a:off x="6560598" y="508090"/>
+            <a:ext cx="5122753" cy="2783750"/>
+          </a:xfrm>
+          <a:prstGeom prst="rect">
+            <a:avLst/>
+          </a:prstGeom>
+        </p:spPr>
+      </p:pic>
+      <p:pic>
+        <p:nvPicPr>
+          <p:cNvPr id="5" name="Picture 4">
+            <a:extLst>
+              <a:ext uri="{FF2B5EF4-FFF2-40B4-BE49-F238E27FC236}">
+                <a16:creationId xmlns:a16="http://schemas.microsoft.com/office/drawing/2014/main" id="{56531E79-8AED-A6D0-1086-4C8429D82A4F}"/>
+              </a:ext>
+            </a:extLst>
+          </p:cNvPr>
+          <p:cNvPicPr>
+            <a:picLocks noChangeAspect="1"/>
+          </p:cNvPicPr>
+          <p:nvPr/>
+        </p:nvPicPr>
+        <p:blipFill>
+          <a:blip r:embed="rId3"/>
+          <a:srcRect r="1" b="3533"/>
+          <a:stretch>
+            <a:fillRect/>
+          </a:stretch>
+        </p:blipFill>
+        <p:spPr>
+          <a:xfrm>
+            <a:off x="6560598" y="3566160"/>
+            <a:ext cx="5122753" cy="2779776"/>
+          </a:xfrm>
+          <a:prstGeom prst="rect">
+            <a:avLst/>
+          </a:prstGeom>
+        </p:spPr>
+      </p:pic>
     </p:spTree>
     <p:extLst>
       <p:ext uri="{BB962C8B-B14F-4D97-AF65-F5344CB8AC3E}">
@@ -4707,6 +5501,14 @@
 <file path=ppt/slides/slide3.xml><?xml version="1.0" encoding="utf-8"?>
 <p:sld xmlns:a="http://schemas.openxmlformats.org/drawingml/2006/main" xmlns:r="http://schemas.openxmlformats.org/officeDocument/2006/relationships" xmlns:p="http://schemas.openxmlformats.org/presentationml/2006/main">
   <p:cSld>
+    <p:bg>
+      <p:bgPr>
+        <a:solidFill>
+          <a:schemeClr val="bg1"/>
+        </a:solidFill>
+        <a:effectLst/>
+      </p:bgPr>
+    </p:bg>
     <p:spTree>
       <p:nvGrpSpPr>
         <p:cNvPr id="1" name=""/>
@@ -4721,6 +5523,66 @@
           <a:chExt cx="0" cy="0"/>
         </a:xfrm>
       </p:grpSpPr>
+      <p:sp useBgFill="1">
+        <p:nvSpPr>
+          <p:cNvPr id="9" name="Rectangle 8">
+            <a:extLst>
+              <a:ext uri="{FF2B5EF4-FFF2-40B4-BE49-F238E27FC236}">
+                <a16:creationId xmlns:a16="http://schemas.microsoft.com/office/drawing/2014/main" id="{A082E5AA-6E5F-4FCC-8C41-11E32F833BFC}"/>
+              </a:ext>
+              <a:ext uri="{C183D7F6-B498-43B3-948B-1728B52AA6E4}">
+                <adec:decorative xmlns:adec="http://schemas.microsoft.com/office/drawing/2017/decorative" val="1"/>
+              </a:ext>
+            </a:extLst>
+          </p:cNvPr>
+          <p:cNvSpPr>
+            <a:spLocks noGrp="1" noRot="1" noChangeAspect="1" noMove="1" noResize="1" noEditPoints="1" noAdjustHandles="1" noChangeArrowheads="1" noChangeShapeType="1" noTextEdit="1"/>
+          </p:cNvSpPr>
+          <p:nvPr>
+            <p:extLst>
+              <p:ext uri="{386F3935-93C4-4BCD-93E2-E3B085C9AB24}">
+                <p16:designElem xmlns:p16="http://schemas.microsoft.com/office/powerpoint/2015/main" val="1"/>
+              </p:ext>
+            </p:extLst>
+          </p:nvPr>
+        </p:nvSpPr>
+        <p:spPr>
+          <a:xfrm>
+            <a:off x="0" y="0"/>
+            <a:ext cx="12188952" cy="6857995"/>
+          </a:xfrm>
+          <a:prstGeom prst="rect">
+            <a:avLst/>
+          </a:prstGeom>
+          <a:ln>
+            <a:noFill/>
+          </a:ln>
+        </p:spPr>
+        <p:style>
+          <a:lnRef idx="2">
+            <a:schemeClr val="accent1">
+              <a:shade val="50000"/>
+            </a:schemeClr>
+          </a:lnRef>
+          <a:fillRef idx="1">
+            <a:schemeClr val="accent1"/>
+          </a:fillRef>
+          <a:effectRef idx="0">
+            <a:schemeClr val="accent1"/>
+          </a:effectRef>
+          <a:fontRef idx="minor">
+            <a:schemeClr val="lt1"/>
+          </a:fontRef>
+        </p:style>
+        <p:txBody>
+          <a:bodyPr rtlCol="0" anchor="ctr"/>
+          <a:lstStyle/>
+          <a:p>
+            <a:pPr algn="ctr"/>
+            <a:endParaRPr lang="en-US"/>
+          </a:p>
+        </p:txBody>
+      </p:sp>
       <p:sp>
         <p:nvSpPr>
           <p:cNvPr id="2" name="Title 1">
@@ -4737,16 +5599,149 @@
             <p:ph type="title"/>
           </p:nvPr>
         </p:nvSpPr>
-        <p:spPr/>
-        <p:txBody>
-          <a:bodyPr/>
-          <a:lstStyle/>
-          <a:p>
-            <a:r>
-              <a:rPr lang="en-US" dirty="0"/>
+        <p:spPr>
+          <a:xfrm>
+            <a:off x="521208" y="978408"/>
+            <a:ext cx="4032504" cy="2697480"/>
+          </a:xfrm>
+        </p:spPr>
+        <p:txBody>
+          <a:bodyPr>
+            <a:normAutofit/>
+          </a:bodyPr>
+          <a:lstStyle/>
+          <a:p>
+            <a:r>
+              <a:rPr lang="en-US"/>
               <a:t>Our Approach</a:t>
             </a:r>
-            <a:endParaRPr lang="ru-RU" dirty="0"/>
+            <a:endParaRPr lang="ru-RU"/>
+          </a:p>
+        </p:txBody>
+      </p:sp>
+      <p:sp>
+        <p:nvSpPr>
+          <p:cNvPr id="10" name="Rectangle 9">
+            <a:extLst>
+              <a:ext uri="{FF2B5EF4-FFF2-40B4-BE49-F238E27FC236}">
+                <a16:creationId xmlns:a16="http://schemas.microsoft.com/office/drawing/2014/main" id="{92BE0106-0C20-465B-A1BE-0BAC2737B1AD}"/>
+              </a:ext>
+              <a:ext uri="{C183D7F6-B498-43B3-948B-1728B52AA6E4}">
+                <adec:decorative xmlns:adec="http://schemas.microsoft.com/office/drawing/2017/decorative" val="1"/>
+              </a:ext>
+            </a:extLst>
+          </p:cNvPr>
+          <p:cNvSpPr>
+            <a:spLocks noGrp="1" noRot="1" noChangeAspect="1" noMove="1" noResize="1" noEditPoints="1" noAdjustHandles="1" noChangeArrowheads="1" noChangeShapeType="1" noTextEdit="1"/>
+          </p:cNvSpPr>
+          <p:nvPr>
+            <p:extLst>
+              <p:ext uri="{386F3935-93C4-4BCD-93E2-E3B085C9AB24}">
+                <p16:designElem xmlns:p16="http://schemas.microsoft.com/office/powerpoint/2015/main" val="1"/>
+              </p:ext>
+            </p:extLst>
+          </p:nvPr>
+        </p:nvSpPr>
+        <p:spPr>
+          <a:xfrm>
+            <a:off x="517870" y="508090"/>
+            <a:ext cx="4032504" cy="149279"/>
+          </a:xfrm>
+          <a:prstGeom prst="rect">
+            <a:avLst/>
+          </a:prstGeom>
+          <a:solidFill>
+            <a:schemeClr val="tx1"/>
+          </a:solidFill>
+          <a:ln>
+            <a:noFill/>
+          </a:ln>
+        </p:spPr>
+        <p:style>
+          <a:lnRef idx="2">
+            <a:schemeClr val="accent1">
+              <a:shade val="50000"/>
+            </a:schemeClr>
+          </a:lnRef>
+          <a:fillRef idx="1">
+            <a:schemeClr val="accent1"/>
+          </a:fillRef>
+          <a:effectRef idx="0">
+            <a:schemeClr val="accent1"/>
+          </a:effectRef>
+          <a:fontRef idx="minor">
+            <a:schemeClr val="lt1"/>
+          </a:fontRef>
+        </p:style>
+        <p:txBody>
+          <a:bodyPr rtlCol="0" anchor="ctr"/>
+          <a:lstStyle/>
+          <a:p>
+            <a:pPr algn="ctr"/>
+            <a:endParaRPr lang="en-US"/>
+          </a:p>
+        </p:txBody>
+      </p:sp>
+      <p:sp>
+        <p:nvSpPr>
+          <p:cNvPr id="11" name="Rectangle 10">
+            <a:extLst>
+              <a:ext uri="{FF2B5EF4-FFF2-40B4-BE49-F238E27FC236}">
+                <a16:creationId xmlns:a16="http://schemas.microsoft.com/office/drawing/2014/main" id="{4A3D569D-D3A6-49CA-A483-291E95DACA14}"/>
+              </a:ext>
+              <a:ext uri="{C183D7F6-B498-43B3-948B-1728B52AA6E4}">
+                <adec:decorative xmlns:adec="http://schemas.microsoft.com/office/drawing/2017/decorative" val="1"/>
+              </a:ext>
+            </a:extLst>
+          </p:cNvPr>
+          <p:cNvSpPr>
+            <a:spLocks noGrp="1" noRot="1" noChangeAspect="1" noMove="1" noResize="1" noEditPoints="1" noAdjustHandles="1" noChangeArrowheads="1" noChangeShapeType="1" noTextEdit="1"/>
+          </p:cNvSpPr>
+          <p:nvPr>
+            <p:extLst>
+              <p:ext uri="{386F3935-93C4-4BCD-93E2-E3B085C9AB24}">
+                <p16:designElem xmlns:p16="http://schemas.microsoft.com/office/powerpoint/2015/main" val="1"/>
+              </p:ext>
+            </p:extLst>
+          </p:nvPr>
+        </p:nvSpPr>
+        <p:spPr>
+          <a:xfrm>
+            <a:off x="5065776" y="611650"/>
+            <a:ext cx="6620256" cy="45719"/>
+          </a:xfrm>
+          <a:prstGeom prst="rect">
+            <a:avLst/>
+          </a:prstGeom>
+          <a:solidFill>
+            <a:schemeClr val="tx1"/>
+          </a:solidFill>
+          <a:ln>
+            <a:noFill/>
+          </a:ln>
+        </p:spPr>
+        <p:style>
+          <a:lnRef idx="2">
+            <a:schemeClr val="accent1">
+              <a:shade val="50000"/>
+            </a:schemeClr>
+          </a:lnRef>
+          <a:fillRef idx="1">
+            <a:schemeClr val="accent1"/>
+          </a:fillRef>
+          <a:effectRef idx="0">
+            <a:schemeClr val="accent1"/>
+          </a:effectRef>
+          <a:fontRef idx="minor">
+            <a:schemeClr val="lt1"/>
+          </a:fontRef>
+        </p:style>
+        <p:txBody>
+          <a:bodyPr rtlCol="0" anchor="ctr"/>
+          <a:lstStyle/>
+          <a:p>
+            <a:pPr algn="ctr"/>
+            <a:endParaRPr lang="en-US"/>
           </a:p>
         </p:txBody>
       </p:sp>
@@ -4766,75 +5761,129 @@
             <p:ph idx="1"/>
           </p:nvPr>
         </p:nvSpPr>
-        <p:spPr/>
-        <p:txBody>
-          <a:bodyPr/>
-          <a:lstStyle/>
-          <a:p>
-            <a:r>
-              <a:rPr lang="en-US" dirty="0"/>
-              <a:t>Data Processing: Leveraged Polars for high-performance data manipulation</a:t>
-            </a:r>
-          </a:p>
-          <a:p>
-            <a:r>
-              <a:rPr lang="en-US" dirty="0"/>
-              <a:t>Visualization: Created interactive dashboard using </a:t>
-            </a:r>
-            <a:r>
-              <a:rPr lang="en-US" dirty="0" err="1"/>
+        <p:spPr>
+          <a:xfrm>
+            <a:off x="5065776" y="978408"/>
+            <a:ext cx="6601968" cy="2697480"/>
+          </a:xfrm>
+        </p:spPr>
+        <p:txBody>
+          <a:bodyPr>
+            <a:normAutofit/>
+          </a:bodyPr>
+          <a:lstStyle/>
+          <a:p>
+            <a:r>
+              <a:rPr lang="en-US"/>
+              <a:t>We combined powerful tools for maximum impact. Polars using rust processes data 10x faster than Pandas, while </a:t>
+            </a:r>
+            <a:r>
+              <a:rPr lang="en-US" err="1"/>
               <a:t>Streamlit</a:t>
             </a:r>
             <a:r>
-              <a:rPr lang="en-US" dirty="0"/>
-              <a:t>, </a:t>
-            </a:r>
-            <a:r>
-              <a:rPr lang="en-US" dirty="0" err="1"/>
-              <a:t>Plotly</a:t>
-            </a:r>
-            <a:r>
-              <a:rPr lang="en-US" dirty="0"/>
-              <a:t>, and Matplotlib</a:t>
-            </a:r>
-          </a:p>
-          <a:p>
-            <a:r>
-              <a:rPr lang="en-US" dirty="0"/>
-              <a:t>Analysis Categories:</a:t>
-            </a:r>
-          </a:p>
-          <a:p>
-            <a:pPr lvl="1"/>
-            <a:r>
-              <a:rPr lang="en-US" dirty="0"/>
-              <a:t>Time-based consumption patterns (hourly, daily, weekly, seasonal)</a:t>
-            </a:r>
-          </a:p>
-          <a:p>
-            <a:pPr lvl="1"/>
-            <a:r>
-              <a:rPr lang="en-US" dirty="0"/>
-              <a:t>Household demographic analysis</a:t>
-            </a:r>
-          </a:p>
-          <a:p>
-            <a:pPr lvl="1"/>
-            <a:r>
-              <a:rPr lang="en-US" dirty="0"/>
-              <a:t>Weather impact assessment</a:t>
-            </a:r>
-          </a:p>
-          <a:p>
-            <a:pPr lvl="1"/>
-            <a:r>
-              <a:rPr lang="en-US" dirty="0"/>
-              <a:t>Anomaly detection using machine learning</a:t>
-            </a:r>
-            <a:endParaRPr lang="ru-RU" dirty="0"/>
-          </a:p>
-        </p:txBody>
-      </p:sp>
+              <a:rPr lang="en-US"/>
+              <a:t> creates an intuitive interface without months of development time.</a:t>
+            </a:r>
+          </a:p>
+          <a:p>
+            <a:r>
+              <a:rPr lang="en-US"/>
+              <a:t>Our analysis covers four key areas: daily and seasonal energy patterns, demographic influences on consumption, weather impacts, and smart anomaly detection using AI.</a:t>
+            </a:r>
+          </a:p>
+        </p:txBody>
+      </p:sp>
+      <p:pic>
+        <p:nvPicPr>
+          <p:cNvPr id="4" name="Picture 3" descr="Streamlit Releases Version 1.0, the Fastest Way to Build">
+            <a:extLst>
+              <a:ext uri="{FF2B5EF4-FFF2-40B4-BE49-F238E27FC236}">
+                <a16:creationId xmlns:a16="http://schemas.microsoft.com/office/drawing/2014/main" id="{1693231C-A320-9FB4-7F53-317E7B88E709}"/>
+              </a:ext>
+            </a:extLst>
+          </p:cNvPr>
+          <p:cNvPicPr>
+            <a:picLocks noChangeAspect="1"/>
+          </p:cNvPicPr>
+          <p:nvPr/>
+        </p:nvPicPr>
+        <p:blipFill>
+          <a:blip r:embed="rId2"/>
+          <a:stretch>
+            <a:fillRect/>
+          </a:stretch>
+        </p:blipFill>
+        <p:spPr>
+          <a:xfrm>
+            <a:off x="517871" y="4286366"/>
+            <a:ext cx="3520440" cy="2059643"/>
+          </a:xfrm>
+          <a:prstGeom prst="rect">
+            <a:avLst/>
+          </a:prstGeom>
+        </p:spPr>
+      </p:pic>
+      <p:pic>
+        <p:nvPicPr>
+          <p:cNvPr id="7" name="Picture 6" descr="Intel Boosts AI Development with Contributions to PyTorch 2.5 - Intel  Newsroom">
+            <a:extLst>
+              <a:ext uri="{FF2B5EF4-FFF2-40B4-BE49-F238E27FC236}">
+                <a16:creationId xmlns:a16="http://schemas.microsoft.com/office/drawing/2014/main" id="{1BA791C4-BBC3-3A51-8772-D9C898BF01F2}"/>
+              </a:ext>
+            </a:extLst>
+          </p:cNvPr>
+          <p:cNvPicPr>
+            <a:picLocks noChangeAspect="1"/>
+          </p:cNvPicPr>
+          <p:nvPr/>
+        </p:nvPicPr>
+        <p:blipFill>
+          <a:blip r:embed="rId3"/>
+          <a:stretch>
+            <a:fillRect/>
+          </a:stretch>
+        </p:blipFill>
+        <p:spPr>
+          <a:xfrm>
+            <a:off x="4340391" y="4365764"/>
+            <a:ext cx="3520440" cy="1980247"/>
+          </a:xfrm>
+          <a:prstGeom prst="rect">
+            <a:avLst/>
+          </a:prstGeom>
+        </p:spPr>
+      </p:pic>
+      <p:pic>
+        <p:nvPicPr>
+          <p:cNvPr id="5" name="Picture 4" descr="Polars for Beginners: The Fast, Modern DataFrame Library">
+            <a:extLst>
+              <a:ext uri="{FF2B5EF4-FFF2-40B4-BE49-F238E27FC236}">
+                <a16:creationId xmlns:a16="http://schemas.microsoft.com/office/drawing/2014/main" id="{1CAB0A27-8B22-9699-6ACB-52F34AF860D7}"/>
+              </a:ext>
+            </a:extLst>
+          </p:cNvPr>
+          <p:cNvPicPr>
+            <a:picLocks noChangeAspect="1"/>
+          </p:cNvPicPr>
+          <p:nvPr/>
+        </p:nvPicPr>
+        <p:blipFill>
+          <a:blip r:embed="rId4"/>
+          <a:stretch>
+            <a:fillRect/>
+          </a:stretch>
+        </p:blipFill>
+        <p:spPr>
+          <a:xfrm>
+            <a:off x="8162911" y="4524182"/>
+            <a:ext cx="3520440" cy="1821827"/>
+          </a:xfrm>
+          <a:prstGeom prst="rect">
+            <a:avLst/>
+          </a:prstGeom>
+        </p:spPr>
+      </p:pic>
     </p:spTree>
     <p:extLst>
       <p:ext uri="{BB962C8B-B14F-4D97-AF65-F5344CB8AC3E}">
@@ -4851,6 +5900,14 @@
 <file path=ppt/slides/slide4.xml><?xml version="1.0" encoding="utf-8"?>
 <p:sld xmlns:a="http://schemas.openxmlformats.org/drawingml/2006/main" xmlns:r="http://schemas.openxmlformats.org/officeDocument/2006/relationships" xmlns:p="http://schemas.openxmlformats.org/presentationml/2006/main">
   <p:cSld>
+    <p:bg>
+      <p:bgPr>
+        <a:solidFill>
+          <a:schemeClr val="bg1"/>
+        </a:solidFill>
+        <a:effectLst/>
+      </p:bgPr>
+    </p:bg>
     <p:spTree>
       <p:nvGrpSpPr>
         <p:cNvPr id="1" name=""/>
@@ -4865,6 +5922,66 @@
           <a:chExt cx="0" cy="0"/>
         </a:xfrm>
       </p:grpSpPr>
+      <p:sp useBgFill="1">
+        <p:nvSpPr>
+          <p:cNvPr id="54" name="Rectangle 53">
+            <a:extLst>
+              <a:ext uri="{FF2B5EF4-FFF2-40B4-BE49-F238E27FC236}">
+                <a16:creationId xmlns:a16="http://schemas.microsoft.com/office/drawing/2014/main" id="{34C0330F-1D4F-4552-B799-615DD237B6DE}"/>
+              </a:ext>
+              <a:ext uri="{C183D7F6-B498-43B3-948B-1728B52AA6E4}">
+                <adec:decorative xmlns:adec="http://schemas.microsoft.com/office/drawing/2017/decorative" val="1"/>
+              </a:ext>
+            </a:extLst>
+          </p:cNvPr>
+          <p:cNvSpPr>
+            <a:spLocks noGrp="1" noRot="1" noChangeAspect="1" noMove="1" noResize="1" noEditPoints="1" noAdjustHandles="1" noChangeArrowheads="1" noChangeShapeType="1" noTextEdit="1"/>
+          </p:cNvSpPr>
+          <p:nvPr>
+            <p:extLst>
+              <p:ext uri="{386F3935-93C4-4BCD-93E2-E3B085C9AB24}">
+                <p16:designElem xmlns:p16="http://schemas.microsoft.com/office/powerpoint/2015/main" val="1"/>
+              </p:ext>
+            </p:extLst>
+          </p:nvPr>
+        </p:nvSpPr>
+        <p:spPr>
+          <a:xfrm>
+            <a:off x="0" y="0"/>
+            <a:ext cx="12188952" cy="6857995"/>
+          </a:xfrm>
+          <a:prstGeom prst="rect">
+            <a:avLst/>
+          </a:prstGeom>
+          <a:ln>
+            <a:noFill/>
+          </a:ln>
+        </p:spPr>
+        <p:style>
+          <a:lnRef idx="2">
+            <a:schemeClr val="accent1">
+              <a:shade val="50000"/>
+            </a:schemeClr>
+          </a:lnRef>
+          <a:fillRef idx="1">
+            <a:schemeClr val="accent1"/>
+          </a:fillRef>
+          <a:effectRef idx="0">
+            <a:schemeClr val="accent1"/>
+          </a:effectRef>
+          <a:fontRef idx="minor">
+            <a:schemeClr val="lt1"/>
+          </a:fontRef>
+        </p:style>
+        <p:txBody>
+          <a:bodyPr rtlCol="0" anchor="ctr"/>
+          <a:lstStyle/>
+          <a:p>
+            <a:pPr algn="ctr"/>
+            <a:endParaRPr lang="en-US"/>
+          </a:p>
+        </p:txBody>
+      </p:sp>
       <p:sp>
         <p:nvSpPr>
           <p:cNvPr id="2" name="Title 1">
@@ -4881,16 +5998,86 @@
             <p:ph type="title"/>
           </p:nvPr>
         </p:nvSpPr>
-        <p:spPr/>
-        <p:txBody>
-          <a:bodyPr/>
-          <a:lstStyle/>
-          <a:p>
-            <a:r>
-              <a:rPr lang="en-US" dirty="0"/>
-              <a:t>Key Finding: Time-Based Consumption Patterns</a:t>
-            </a:r>
-            <a:endParaRPr lang="ru-RU" dirty="0"/>
+        <p:spPr>
+          <a:xfrm>
+            <a:off x="521208" y="978408"/>
+            <a:ext cx="5020056" cy="1463040"/>
+          </a:xfrm>
+        </p:spPr>
+        <p:txBody>
+          <a:bodyPr>
+            <a:normAutofit/>
+          </a:bodyPr>
+          <a:lstStyle/>
+          <a:p>
+            <a:r>
+              <a:rPr lang="en-US"/>
+              <a:t>Daily Life Through Energy Data</a:t>
+            </a:r>
+            <a:endParaRPr lang="ru-RU"/>
+          </a:p>
+        </p:txBody>
+      </p:sp>
+      <p:sp>
+        <p:nvSpPr>
+          <p:cNvPr id="55" name="Rectangle 54">
+            <a:extLst>
+              <a:ext uri="{FF2B5EF4-FFF2-40B4-BE49-F238E27FC236}">
+                <a16:creationId xmlns:a16="http://schemas.microsoft.com/office/drawing/2014/main" id="{92BE0106-0C20-465B-A1BE-0BAC2737B1AD}"/>
+              </a:ext>
+              <a:ext uri="{C183D7F6-B498-43B3-948B-1728B52AA6E4}">
+                <adec:decorative xmlns:adec="http://schemas.microsoft.com/office/drawing/2017/decorative" val="1"/>
+              </a:ext>
+            </a:extLst>
+          </p:cNvPr>
+          <p:cNvSpPr>
+            <a:spLocks noGrp="1" noRot="1" noChangeAspect="1" noMove="1" noResize="1" noEditPoints="1" noAdjustHandles="1" noChangeArrowheads="1" noChangeShapeType="1" noTextEdit="1"/>
+          </p:cNvSpPr>
+          <p:nvPr>
+            <p:extLst>
+              <p:ext uri="{386F3935-93C4-4BCD-93E2-E3B085C9AB24}">
+                <p16:designElem xmlns:p16="http://schemas.microsoft.com/office/powerpoint/2015/main" val="1"/>
+              </p:ext>
+            </p:extLst>
+          </p:nvPr>
+        </p:nvSpPr>
+        <p:spPr>
+          <a:xfrm>
+            <a:off x="517870" y="508090"/>
+            <a:ext cx="5021183" cy="149279"/>
+          </a:xfrm>
+          <a:prstGeom prst="rect">
+            <a:avLst/>
+          </a:prstGeom>
+          <a:solidFill>
+            <a:schemeClr val="tx1"/>
+          </a:solidFill>
+          <a:ln>
+            <a:noFill/>
+          </a:ln>
+        </p:spPr>
+        <p:style>
+          <a:lnRef idx="2">
+            <a:schemeClr val="accent1">
+              <a:shade val="50000"/>
+            </a:schemeClr>
+          </a:lnRef>
+          <a:fillRef idx="1">
+            <a:schemeClr val="accent1"/>
+          </a:fillRef>
+          <a:effectRef idx="0">
+            <a:schemeClr val="accent1"/>
+          </a:effectRef>
+          <a:fontRef idx="minor">
+            <a:schemeClr val="lt1"/>
+          </a:fontRef>
+        </p:style>
+        <p:txBody>
+          <a:bodyPr rtlCol="0" anchor="ctr"/>
+          <a:lstStyle/>
+          <a:p>
+            <a:pPr algn="ctr"/>
+            <a:endParaRPr lang="en-US"/>
           </a:p>
         </p:txBody>
       </p:sp>
@@ -4910,37 +6097,111 @@
             <p:ph idx="1"/>
           </p:nvPr>
         </p:nvSpPr>
-        <p:spPr/>
-        <p:txBody>
-          <a:bodyPr/>
-          <a:lstStyle/>
-          <a:p>
-            <a:r>
-              <a:rPr lang="en-US" dirty="0"/>
-              <a:t>Daily consumption peaks at 7-9 AM and 5-8 PM, aligned with household activity</a:t>
-            </a:r>
-          </a:p>
-          <a:p>
-            <a:r>
-              <a:rPr lang="en-US" dirty="0"/>
-              <a:t>Weekends show flatter consumption patterns with extended morning peaks</a:t>
-            </a:r>
-          </a:p>
-          <a:p>
-            <a:r>
-              <a:rPr lang="en-US" dirty="0"/>
-              <a:t>Winter months exhibit higher overall consumption compared to summer</a:t>
-            </a:r>
-          </a:p>
-          <a:p>
-            <a:r>
-              <a:rPr lang="en-US" dirty="0"/>
-              <a:t>Visualized: Daily, weekly, and seasonal energy usage variations [Insert hourly_consumption.png or seasonal_patterns.png]</a:t>
-            </a:r>
-            <a:endParaRPr lang="ru-RU" dirty="0"/>
-          </a:p>
-        </p:txBody>
-      </p:sp>
+        <p:spPr>
+          <a:xfrm>
+            <a:off x="521208" y="2578608"/>
+            <a:ext cx="5020056" cy="3767328"/>
+          </a:xfrm>
+        </p:spPr>
+        <p:txBody>
+          <a:bodyPr>
+            <a:normAutofit/>
+          </a:bodyPr>
+          <a:lstStyle/>
+          <a:p>
+            <a:r>
+              <a:rPr lang="en-US"/>
+              <a:t>The data tells London's story beautifully. Every morning between 7-9 AM, energy spikes as the city wakes up and gets ready for work. Another surge hits 5-8 PM when everyone comes home and starts cooking dinner.</a:t>
+            </a:r>
+          </a:p>
+          <a:p>
+            <a:r>
+              <a:rPr lang="en-US"/>
+              <a:t>Winter months show 20-30% higher consumption than summer, with the coldest periods hitting peak usage.</a:t>
+            </a:r>
+          </a:p>
+          <a:p>
+            <a:r>
+              <a:rPr lang="en-US"/>
+              <a:t>In weekends overall consumption is higher</a:t>
+            </a:r>
+          </a:p>
+        </p:txBody>
+      </p:sp>
+      <p:pic>
+        <p:nvPicPr>
+          <p:cNvPr id="11" name="Picture 10" descr="A graph of different colored bars&#10;&#10;AI-generated content may be incorrect.">
+            <a:extLst>
+              <a:ext uri="{FF2B5EF4-FFF2-40B4-BE49-F238E27FC236}">
+                <a16:creationId xmlns:a16="http://schemas.microsoft.com/office/drawing/2014/main" id="{11324186-FD95-987C-EE14-71C8F4C62A71}"/>
+              </a:ext>
+            </a:extLst>
+          </p:cNvPr>
+          <p:cNvPicPr>
+            <a:picLocks noChangeAspect="1"/>
+          </p:cNvPicPr>
+          <p:nvPr/>
+        </p:nvPicPr>
+        <p:blipFill>
+          <a:blip r:embed="rId3">
+            <a:extLst>
+              <a:ext uri="{28A0092B-C50C-407E-A947-70E740481C1C}">
+                <a14:useLocalDpi xmlns:a14="http://schemas.microsoft.com/office/drawing/2010/main" val="0"/>
+              </a:ext>
+            </a:extLst>
+          </a:blip>
+          <a:srcRect l="1" t="1" r="258" b="-2"/>
+          <a:stretch>
+            <a:fillRect/>
+          </a:stretch>
+        </p:blipFill>
+        <p:spPr>
+          <a:xfrm>
+            <a:off x="5539053" y="3495496"/>
+            <a:ext cx="6563823" cy="3027187"/>
+          </a:xfrm>
+          <a:prstGeom prst="rect">
+            <a:avLst/>
+          </a:prstGeom>
+        </p:spPr>
+      </p:pic>
+      <p:pic>
+        <p:nvPicPr>
+          <p:cNvPr id="9" name="Picture 8" descr="A graph with a line&#10;&#10;AI-generated content may be incorrect.">
+            <a:extLst>
+              <a:ext uri="{FF2B5EF4-FFF2-40B4-BE49-F238E27FC236}">
+                <a16:creationId xmlns:a16="http://schemas.microsoft.com/office/drawing/2014/main" id="{4A3F1630-385D-4B72-E162-A428685E1E93}"/>
+              </a:ext>
+            </a:extLst>
+          </p:cNvPr>
+          <p:cNvPicPr>
+            <a:picLocks noChangeAspect="1"/>
+          </p:cNvPicPr>
+          <p:nvPr/>
+        </p:nvPicPr>
+        <p:blipFill>
+          <a:blip r:embed="rId4">
+            <a:extLst>
+              <a:ext uri="{28A0092B-C50C-407E-A947-70E740481C1C}">
+                <a14:useLocalDpi xmlns:a14="http://schemas.microsoft.com/office/drawing/2010/main" val="0"/>
+              </a:ext>
+            </a:extLst>
+          </a:blip>
+          <a:srcRect l="-1132" t="1" r="-33" b="-4"/>
+          <a:stretch>
+            <a:fillRect/>
+          </a:stretch>
+        </p:blipFill>
+        <p:spPr>
+          <a:xfrm>
+            <a:off x="5806335" y="582729"/>
+            <a:ext cx="6113124" cy="2779776"/>
+          </a:xfrm>
+          <a:prstGeom prst="rect">
+            <a:avLst/>
+          </a:prstGeom>
+        </p:spPr>
+      </p:pic>
     </p:spTree>
     <p:extLst>
       <p:ext uri="{BB962C8B-B14F-4D97-AF65-F5344CB8AC3E}">
@@ -4957,6 +6218,14 @@
 <file path=ppt/slides/slide5.xml><?xml version="1.0" encoding="utf-8"?>
 <p:sld xmlns:a="http://schemas.openxmlformats.org/drawingml/2006/main" xmlns:r="http://schemas.openxmlformats.org/officeDocument/2006/relationships" xmlns:p="http://schemas.openxmlformats.org/presentationml/2006/main">
   <p:cSld>
+    <p:bg>
+      <p:bgPr>
+        <a:solidFill>
+          <a:schemeClr val="bg1"/>
+        </a:solidFill>
+        <a:effectLst/>
+      </p:bgPr>
+    </p:bg>
     <p:spTree>
       <p:nvGrpSpPr>
         <p:cNvPr id="1" name=""/>
@@ -4971,6 +6240,66 @@
           <a:chExt cx="0" cy="0"/>
         </a:xfrm>
       </p:grpSpPr>
+      <p:sp useBgFill="1">
+        <p:nvSpPr>
+          <p:cNvPr id="36" name="Rectangle 35">
+            <a:extLst>
+              <a:ext uri="{FF2B5EF4-FFF2-40B4-BE49-F238E27FC236}">
+                <a16:creationId xmlns:a16="http://schemas.microsoft.com/office/drawing/2014/main" id="{34C0330F-1D4F-4552-B799-615DD237B6DE}"/>
+              </a:ext>
+              <a:ext uri="{C183D7F6-B498-43B3-948B-1728B52AA6E4}">
+                <adec:decorative xmlns:adec="http://schemas.microsoft.com/office/drawing/2017/decorative" val="1"/>
+              </a:ext>
+            </a:extLst>
+          </p:cNvPr>
+          <p:cNvSpPr>
+            <a:spLocks noGrp="1" noRot="1" noChangeAspect="1" noMove="1" noResize="1" noEditPoints="1" noAdjustHandles="1" noChangeArrowheads="1" noChangeShapeType="1" noTextEdit="1"/>
+          </p:cNvSpPr>
+          <p:nvPr>
+            <p:extLst>
+              <p:ext uri="{386F3935-93C4-4BCD-93E2-E3B085C9AB24}">
+                <p16:designElem xmlns:p16="http://schemas.microsoft.com/office/powerpoint/2015/main" val="1"/>
+              </p:ext>
+            </p:extLst>
+          </p:nvPr>
+        </p:nvSpPr>
+        <p:spPr>
+          <a:xfrm>
+            <a:off x="0" y="0"/>
+            <a:ext cx="12188952" cy="6857995"/>
+          </a:xfrm>
+          <a:prstGeom prst="rect">
+            <a:avLst/>
+          </a:prstGeom>
+          <a:ln>
+            <a:noFill/>
+          </a:ln>
+        </p:spPr>
+        <p:style>
+          <a:lnRef idx="2">
+            <a:schemeClr val="accent1">
+              <a:shade val="50000"/>
+            </a:schemeClr>
+          </a:lnRef>
+          <a:fillRef idx="1">
+            <a:schemeClr val="accent1"/>
+          </a:fillRef>
+          <a:effectRef idx="0">
+            <a:schemeClr val="accent1"/>
+          </a:effectRef>
+          <a:fontRef idx="minor">
+            <a:schemeClr val="lt1"/>
+          </a:fontRef>
+        </p:style>
+        <p:txBody>
+          <a:bodyPr rtlCol="0" anchor="ctr"/>
+          <a:lstStyle/>
+          <a:p>
+            <a:pPr algn="ctr"/>
+            <a:endParaRPr lang="en-US"/>
+          </a:p>
+        </p:txBody>
+      </p:sp>
       <p:sp>
         <p:nvSpPr>
           <p:cNvPr id="2" name="Title 1">
@@ -4987,16 +6316,94 @@
             <p:ph type="title"/>
           </p:nvPr>
         </p:nvSpPr>
-        <p:spPr/>
-        <p:txBody>
-          <a:bodyPr/>
-          <a:lstStyle/>
-          <a:p>
-            <a:r>
-              <a:rPr lang="en-US" dirty="0"/>
-              <a:t>Key Finding: Demographic Influences</a:t>
-            </a:r>
-            <a:endParaRPr lang="ru-RU" dirty="0"/>
+        <p:spPr>
+          <a:xfrm>
+            <a:off x="521208" y="978408"/>
+            <a:ext cx="5020056" cy="1463040"/>
+          </a:xfrm>
+        </p:spPr>
+        <p:txBody>
+          <a:bodyPr>
+            <a:normAutofit/>
+          </a:bodyPr>
+          <a:lstStyle/>
+          <a:p>
+            <a:pPr>
+              <a:lnSpc>
+                <a:spcPct val="90000"/>
+              </a:lnSpc>
+            </a:pPr>
+            <a:r>
+              <a:rPr lang="en-US" sz="3700">
+                <a:ea typeface="+mj-lt"/>
+                <a:cs typeface="+mj-lt"/>
+              </a:rPr>
+              <a:t>Demographics Drive Energy Patterns</a:t>
+            </a:r>
+            <a:endParaRPr lang="en-US" sz="3700"/>
+          </a:p>
+        </p:txBody>
+      </p:sp>
+      <p:sp>
+        <p:nvSpPr>
+          <p:cNvPr id="38" name="Rectangle 37">
+            <a:extLst>
+              <a:ext uri="{FF2B5EF4-FFF2-40B4-BE49-F238E27FC236}">
+                <a16:creationId xmlns:a16="http://schemas.microsoft.com/office/drawing/2014/main" id="{92BE0106-0C20-465B-A1BE-0BAC2737B1AD}"/>
+              </a:ext>
+              <a:ext uri="{C183D7F6-B498-43B3-948B-1728B52AA6E4}">
+                <adec:decorative xmlns:adec="http://schemas.microsoft.com/office/drawing/2017/decorative" val="1"/>
+              </a:ext>
+            </a:extLst>
+          </p:cNvPr>
+          <p:cNvSpPr>
+            <a:spLocks noGrp="1" noRot="1" noChangeAspect="1" noMove="1" noResize="1" noEditPoints="1" noAdjustHandles="1" noChangeArrowheads="1" noChangeShapeType="1" noTextEdit="1"/>
+          </p:cNvSpPr>
+          <p:nvPr>
+            <p:extLst>
+              <p:ext uri="{386F3935-93C4-4BCD-93E2-E3B085C9AB24}">
+                <p16:designElem xmlns:p16="http://schemas.microsoft.com/office/powerpoint/2015/main" val="1"/>
+              </p:ext>
+            </p:extLst>
+          </p:nvPr>
+        </p:nvSpPr>
+        <p:spPr>
+          <a:xfrm>
+            <a:off x="517870" y="508090"/>
+            <a:ext cx="5021183" cy="149279"/>
+          </a:xfrm>
+          <a:prstGeom prst="rect">
+            <a:avLst/>
+          </a:prstGeom>
+          <a:solidFill>
+            <a:schemeClr val="tx1"/>
+          </a:solidFill>
+          <a:ln>
+            <a:noFill/>
+          </a:ln>
+        </p:spPr>
+        <p:style>
+          <a:lnRef idx="2">
+            <a:schemeClr val="accent1">
+              <a:shade val="50000"/>
+            </a:schemeClr>
+          </a:lnRef>
+          <a:fillRef idx="1">
+            <a:schemeClr val="accent1"/>
+          </a:fillRef>
+          <a:effectRef idx="0">
+            <a:schemeClr val="accent1"/>
+          </a:effectRef>
+          <a:fontRef idx="minor">
+            <a:schemeClr val="lt1"/>
+          </a:fontRef>
+        </p:style>
+        <p:txBody>
+          <a:bodyPr rtlCol="0" anchor="ctr"/>
+          <a:lstStyle/>
+          <a:p>
+            <a:pPr algn="ctr"/>
+            <a:endParaRPr lang="en-US"/>
           </a:p>
         </p:txBody>
       </p:sp>
@@ -5016,37 +6423,137 @@
             <p:ph idx="1"/>
           </p:nvPr>
         </p:nvSpPr>
-        <p:spPr/>
-        <p:txBody>
-          <a:bodyPr/>
-          <a:lstStyle/>
-          <a:p>
-            <a:r>
-              <a:rPr lang="en-US" dirty="0"/>
-              <a:t>Different ACORN groups show distinct consumption behaviors</a:t>
-            </a:r>
-          </a:p>
-          <a:p>
-            <a:r>
-              <a:rPr lang="en-US" dirty="0"/>
-              <a:t>Affluent households consume more energy but respond more actively to price signals</a:t>
-            </a:r>
-          </a:p>
-          <a:p>
-            <a:r>
-              <a:rPr lang="en-US" dirty="0"/>
-              <a:t>Household size and composition significantly impact consumption patterns</a:t>
-            </a:r>
-          </a:p>
-          <a:p>
-            <a:r>
-              <a:rPr lang="en-US" dirty="0"/>
-              <a:t>Visualized: Comparative analysis across demographic segments [Insert acorn_analysis.png or household_distribution.png]</a:t>
-            </a:r>
-            <a:endParaRPr lang="ru-RU" dirty="0"/>
-          </a:p>
-        </p:txBody>
-      </p:sp>
+        <p:spPr>
+          <a:xfrm>
+            <a:off x="521208" y="2578608"/>
+            <a:ext cx="5020056" cy="3767328"/>
+          </a:xfrm>
+        </p:spPr>
+        <p:txBody>
+          <a:bodyPr vert="horz" lIns="91440" tIns="45720" rIns="91440" bIns="45720" rtlCol="0">
+            <a:normAutofit/>
+          </a:bodyPr>
+          <a:lstStyle/>
+          <a:p>
+            <a:pPr>
+              <a:lnSpc>
+                <a:spcPct val="100000"/>
+              </a:lnSpc>
+            </a:pPr>
+            <a:r>
+              <a:rPr lang="en-US" sz="1500">
+                <a:ea typeface="+mn-lt"/>
+                <a:cs typeface="+mn-lt"/>
+              </a:rPr>
+              <a:t>ACORN demographic groups show dramatic consumption differences. Affluent households (Groups A-E) consume significantly more energy overall but show lower price sensitivity to Time-of-Use tariffs. Adversity groups (K-Q) demonstrate much lower baseline consumption while representing the second-largest household segment.</a:t>
+            </a:r>
+          </a:p>
+          <a:p>
+            <a:pPr>
+              <a:lnSpc>
+                <a:spcPct val="100000"/>
+              </a:lnSpc>
+            </a:pPr>
+            <a:r>
+              <a:rPr lang="en-US" sz="1500">
+                <a:ea typeface="+mn-lt"/>
+                <a:cs typeface="+mn-lt"/>
+              </a:rPr>
+              <a:t>Tariff type creates behavioral splits – Time-of-Use customers consistently consume less across all demographic groups, with affluent segments showing the largest consumption differential between Standard and </a:t>
+            </a:r>
+            <a:r>
+              <a:rPr lang="en-US" sz="1500" err="1">
+                <a:ea typeface="+mn-lt"/>
+                <a:cs typeface="+mn-lt"/>
+              </a:rPr>
+              <a:t>ToU</a:t>
+            </a:r>
+            <a:r>
+              <a:rPr lang="en-US" sz="1500">
+                <a:ea typeface="+mn-lt"/>
+                <a:cs typeface="+mn-lt"/>
+              </a:rPr>
+              <a:t> tariffs, suggesting </a:t>
+            </a:r>
+            <a:r>
+              <a:rPr lang="en-US" sz="1500" err="1">
+                <a:ea typeface="+mn-lt"/>
+                <a:cs typeface="+mn-lt"/>
+              </a:rPr>
+              <a:t>ToU</a:t>
+            </a:r>
+            <a:r>
+              <a:rPr lang="en-US" sz="1500">
+                <a:ea typeface="+mn-lt"/>
+                <a:cs typeface="+mn-lt"/>
+              </a:rPr>
+              <a:t> pricing effectively encourages conservation even among high-usage households.</a:t>
+            </a:r>
+          </a:p>
+        </p:txBody>
+      </p:sp>
+      <p:pic>
+        <p:nvPicPr>
+          <p:cNvPr id="6" name="Picture 5">
+            <a:extLst>
+              <a:ext uri="{FF2B5EF4-FFF2-40B4-BE49-F238E27FC236}">
+                <a16:creationId xmlns:a16="http://schemas.microsoft.com/office/drawing/2014/main" id="{B10961D7-C675-23EB-922F-4C5866F353BC}"/>
+              </a:ext>
+            </a:extLst>
+          </p:cNvPr>
+          <p:cNvPicPr>
+            <a:picLocks noChangeAspect="1"/>
+          </p:cNvPicPr>
+          <p:nvPr/>
+        </p:nvPicPr>
+        <p:blipFill>
+          <a:blip r:embed="rId2"/>
+          <a:srcRect t="21861" r="1" b="7105"/>
+          <a:stretch>
+            <a:fillRect/>
+          </a:stretch>
+        </p:blipFill>
+        <p:spPr>
+          <a:xfrm>
+            <a:off x="6560598" y="508090"/>
+            <a:ext cx="5122753" cy="2783750"/>
+          </a:xfrm>
+          <a:prstGeom prst="rect">
+            <a:avLst/>
+          </a:prstGeom>
+        </p:spPr>
+      </p:pic>
+      <p:pic>
+        <p:nvPicPr>
+          <p:cNvPr id="7" name="Picture 6">
+            <a:extLst>
+              <a:ext uri="{FF2B5EF4-FFF2-40B4-BE49-F238E27FC236}">
+                <a16:creationId xmlns:a16="http://schemas.microsoft.com/office/drawing/2014/main" id="{5220BF88-BE6A-ED30-03AA-2917B4BC4C6F}"/>
+              </a:ext>
+            </a:extLst>
+          </p:cNvPr>
+          <p:cNvPicPr>
+            <a:picLocks noChangeAspect="1"/>
+          </p:cNvPicPr>
+          <p:nvPr/>
+        </p:nvPicPr>
+        <p:blipFill>
+          <a:blip r:embed="rId3"/>
+          <a:srcRect t="14881" r="1" b="1"/>
+          <a:stretch>
+            <a:fillRect/>
+          </a:stretch>
+        </p:blipFill>
+        <p:spPr>
+          <a:xfrm>
+            <a:off x="6560598" y="3566160"/>
+            <a:ext cx="5122753" cy="2779776"/>
+          </a:xfrm>
+          <a:prstGeom prst="rect">
+            <a:avLst/>
+          </a:prstGeom>
+        </p:spPr>
+      </p:pic>
     </p:spTree>
     <p:extLst>
       <p:ext uri="{BB962C8B-B14F-4D97-AF65-F5344CB8AC3E}">
@@ -5063,6 +6570,14 @@
 <file path=ppt/slides/slide6.xml><?xml version="1.0" encoding="utf-8"?>
 <p:sld xmlns:a="http://schemas.openxmlformats.org/drawingml/2006/main" xmlns:r="http://schemas.openxmlformats.org/officeDocument/2006/relationships" xmlns:p="http://schemas.openxmlformats.org/presentationml/2006/main">
   <p:cSld>
+    <p:bg>
+      <p:bgPr>
+        <a:solidFill>
+          <a:schemeClr val="bg1"/>
+        </a:solidFill>
+        <a:effectLst/>
+      </p:bgPr>
+    </p:bg>
     <p:spTree>
       <p:nvGrpSpPr>
         <p:cNvPr id="1" name=""/>
@@ -5077,6 +6592,66 @@
           <a:chExt cx="0" cy="0"/>
         </a:xfrm>
       </p:grpSpPr>
+      <p:sp useBgFill="1">
+        <p:nvSpPr>
+          <p:cNvPr id="19" name="Rectangle 18">
+            <a:extLst>
+              <a:ext uri="{FF2B5EF4-FFF2-40B4-BE49-F238E27FC236}">
+                <a16:creationId xmlns:a16="http://schemas.microsoft.com/office/drawing/2014/main" id="{34C0330F-1D4F-4552-B799-615DD237B6DE}"/>
+              </a:ext>
+              <a:ext uri="{C183D7F6-B498-43B3-948B-1728B52AA6E4}">
+                <adec:decorative xmlns:adec="http://schemas.microsoft.com/office/drawing/2017/decorative" val="1"/>
+              </a:ext>
+            </a:extLst>
+          </p:cNvPr>
+          <p:cNvSpPr>
+            <a:spLocks noGrp="1" noRot="1" noChangeAspect="1" noMove="1" noResize="1" noEditPoints="1" noAdjustHandles="1" noChangeArrowheads="1" noChangeShapeType="1" noTextEdit="1"/>
+          </p:cNvSpPr>
+          <p:nvPr>
+            <p:extLst>
+              <p:ext uri="{386F3935-93C4-4BCD-93E2-E3B085C9AB24}">
+                <p16:designElem xmlns:p16="http://schemas.microsoft.com/office/powerpoint/2015/main" val="1"/>
+              </p:ext>
+            </p:extLst>
+          </p:nvPr>
+        </p:nvSpPr>
+        <p:spPr>
+          <a:xfrm>
+            <a:off x="0" y="0"/>
+            <a:ext cx="12188952" cy="6857995"/>
+          </a:xfrm>
+          <a:prstGeom prst="rect">
+            <a:avLst/>
+          </a:prstGeom>
+          <a:ln>
+            <a:noFill/>
+          </a:ln>
+        </p:spPr>
+        <p:style>
+          <a:lnRef idx="2">
+            <a:schemeClr val="accent1">
+              <a:shade val="50000"/>
+            </a:schemeClr>
+          </a:lnRef>
+          <a:fillRef idx="1">
+            <a:schemeClr val="accent1"/>
+          </a:fillRef>
+          <a:effectRef idx="0">
+            <a:schemeClr val="accent1"/>
+          </a:effectRef>
+          <a:fontRef idx="minor">
+            <a:schemeClr val="lt1"/>
+          </a:fontRef>
+        </p:style>
+        <p:txBody>
+          <a:bodyPr rtlCol="0" anchor="ctr"/>
+          <a:lstStyle/>
+          <a:p>
+            <a:pPr algn="ctr"/>
+            <a:endParaRPr lang="en-US"/>
+          </a:p>
+        </p:txBody>
+      </p:sp>
       <p:sp>
         <p:nvSpPr>
           <p:cNvPr id="2" name="Title 1">
@@ -5093,16 +6668,86 @@
             <p:ph type="title"/>
           </p:nvPr>
         </p:nvSpPr>
-        <p:spPr/>
-        <p:txBody>
-          <a:bodyPr/>
-          <a:lstStyle/>
-          <a:p>
-            <a:r>
-              <a:rPr lang="en-US" dirty="0"/>
-              <a:t>Key Finding: Weather's Influence on Energy Usage</a:t>
-            </a:r>
-            <a:endParaRPr lang="ru-RU" dirty="0"/>
+        <p:spPr>
+          <a:xfrm>
+            <a:off x="521208" y="978408"/>
+            <a:ext cx="5020056" cy="1463040"/>
+          </a:xfrm>
+        </p:spPr>
+        <p:txBody>
+          <a:bodyPr>
+            <a:normAutofit/>
+          </a:bodyPr>
+          <a:lstStyle/>
+          <a:p>
+            <a:r>
+              <a:rPr lang="en-US"/>
+              <a:t>Weather's Hidden Impact</a:t>
+            </a:r>
+            <a:endParaRPr lang="ru-RU"/>
+          </a:p>
+        </p:txBody>
+      </p:sp>
+      <p:sp>
+        <p:nvSpPr>
+          <p:cNvPr id="21" name="Rectangle 20">
+            <a:extLst>
+              <a:ext uri="{FF2B5EF4-FFF2-40B4-BE49-F238E27FC236}">
+                <a16:creationId xmlns:a16="http://schemas.microsoft.com/office/drawing/2014/main" id="{92BE0106-0C20-465B-A1BE-0BAC2737B1AD}"/>
+              </a:ext>
+              <a:ext uri="{C183D7F6-B498-43B3-948B-1728B52AA6E4}">
+                <adec:decorative xmlns:adec="http://schemas.microsoft.com/office/drawing/2017/decorative" val="1"/>
+              </a:ext>
+            </a:extLst>
+          </p:cNvPr>
+          <p:cNvSpPr>
+            <a:spLocks noGrp="1" noRot="1" noChangeAspect="1" noMove="1" noResize="1" noEditPoints="1" noAdjustHandles="1" noChangeArrowheads="1" noChangeShapeType="1" noTextEdit="1"/>
+          </p:cNvSpPr>
+          <p:nvPr>
+            <p:extLst>
+              <p:ext uri="{386F3935-93C4-4BCD-93E2-E3B085C9AB24}">
+                <p16:designElem xmlns:p16="http://schemas.microsoft.com/office/powerpoint/2015/main" val="1"/>
+              </p:ext>
+            </p:extLst>
+          </p:nvPr>
+        </p:nvSpPr>
+        <p:spPr>
+          <a:xfrm>
+            <a:off x="517870" y="508090"/>
+            <a:ext cx="5021183" cy="149279"/>
+          </a:xfrm>
+          <a:prstGeom prst="rect">
+            <a:avLst/>
+          </a:prstGeom>
+          <a:solidFill>
+            <a:schemeClr val="tx1"/>
+          </a:solidFill>
+          <a:ln>
+            <a:noFill/>
+          </a:ln>
+        </p:spPr>
+        <p:style>
+          <a:lnRef idx="2">
+            <a:schemeClr val="accent1">
+              <a:shade val="50000"/>
+            </a:schemeClr>
+          </a:lnRef>
+          <a:fillRef idx="1">
+            <a:schemeClr val="accent1"/>
+          </a:fillRef>
+          <a:effectRef idx="0">
+            <a:schemeClr val="accent1"/>
+          </a:effectRef>
+          <a:fontRef idx="minor">
+            <a:schemeClr val="lt1"/>
+          </a:fontRef>
+        </p:style>
+        <p:txBody>
+          <a:bodyPr rtlCol="0" anchor="ctr"/>
+          <a:lstStyle/>
+          <a:p>
+            <a:pPr algn="ctr"/>
+            <a:endParaRPr lang="en-US"/>
           </a:p>
         </p:txBody>
       </p:sp>
@@ -5122,37 +6767,113 @@
             <p:ph idx="1"/>
           </p:nvPr>
         </p:nvSpPr>
-        <p:spPr/>
-        <p:txBody>
-          <a:bodyPr/>
-          <a:lstStyle/>
-          <a:p>
-            <a:r>
-              <a:rPr lang="en-US" dirty="0"/>
-              <a:t>Strong negative correlation between temperature and energy consumption</a:t>
-            </a:r>
-          </a:p>
-          <a:p>
-            <a:r>
-              <a:rPr lang="en-US" dirty="0"/>
-              <a:t>Energy usage increases by approximately 15% for every 5°C drop in temperature</a:t>
-            </a:r>
-          </a:p>
-          <a:p>
-            <a:r>
-              <a:rPr lang="en-US" dirty="0"/>
-              <a:t>Heating behavior varies significantly across demographic groups</a:t>
-            </a:r>
-          </a:p>
-          <a:p>
-            <a:r>
-              <a:rPr lang="en-US" dirty="0"/>
-              <a:t>Visualized: Temperature vs. energy usage relationship [Insert temp_consumption_curve.png or temp_daily_impact.png]</a:t>
-            </a:r>
-            <a:endParaRPr lang="ru-RU" dirty="0"/>
-          </a:p>
-        </p:txBody>
-      </p:sp>
+        <p:spPr>
+          <a:xfrm>
+            <a:off x="521208" y="2578608"/>
+            <a:ext cx="5020056" cy="3767328"/>
+          </a:xfrm>
+        </p:spPr>
+        <p:txBody>
+          <a:bodyPr>
+            <a:normAutofit/>
+          </a:bodyPr>
+          <a:lstStyle/>
+          <a:p>
+            <a:r>
+              <a:rPr lang="en-US" b="1"/>
+              <a:t>Temperature threshold effect</a:t>
+            </a:r>
+            <a:r>
+              <a:rPr lang="en-US"/>
+              <a:t>: Below 5°C, each degree drop increases consumption by approximately 0.02-0.03 kWh per hour, with the effect amplified during peak hours</a:t>
+            </a:r>
+          </a:p>
+          <a:p>
+            <a:r>
+              <a:rPr lang="en-US" b="1"/>
+              <a:t>Evening peak intensity</a:t>
+            </a:r>
+            <a:r>
+              <a:rPr lang="en-US"/>
+              <a:t>: The highest energy consumption occurs between 18:00-19:00 (6-7 PM), with below-freezing temperatures showing consumption spikes up to 0.90 kWh, compared to only 0.45-0.50 kWh during the same hours in the 15-20°C range</a:t>
+            </a:r>
+          </a:p>
+        </p:txBody>
+      </p:sp>
+      <p:pic>
+        <p:nvPicPr>
+          <p:cNvPr id="7" name="Picture 6" descr="A chart of a temperature&#10;&#10;AI-generated content may be incorrect.">
+            <a:extLst>
+              <a:ext uri="{FF2B5EF4-FFF2-40B4-BE49-F238E27FC236}">
+                <a16:creationId xmlns:a16="http://schemas.microsoft.com/office/drawing/2014/main" id="{297FFF91-8361-DA28-5CF5-A4EC34361462}"/>
+              </a:ext>
+            </a:extLst>
+          </p:cNvPr>
+          <p:cNvPicPr>
+            <a:picLocks noChangeAspect="1"/>
+          </p:cNvPicPr>
+          <p:nvPr/>
+        </p:nvPicPr>
+        <p:blipFill>
+          <a:blip r:embed="rId2">
+            <a:extLst>
+              <a:ext uri="{28A0092B-C50C-407E-A947-70E740481C1C}">
+                <a14:useLocalDpi xmlns:a14="http://schemas.microsoft.com/office/drawing/2010/main" val="0"/>
+              </a:ext>
+            </a:extLst>
+          </a:blip>
+          <a:srcRect l="-79" t="3" r="919" b="-4"/>
+          <a:stretch>
+            <a:fillRect/>
+          </a:stretch>
+        </p:blipFill>
+        <p:spPr>
+          <a:xfrm>
+            <a:off x="5862522" y="508090"/>
+            <a:ext cx="6000750" cy="2783750"/>
+          </a:xfrm>
+          <a:prstGeom prst="rect">
+            <a:avLst/>
+          </a:prstGeom>
+        </p:spPr>
+      </p:pic>
+      <p:pic>
+        <p:nvPicPr>
+          <p:cNvPr id="5" name="Picture 4" descr="A graph of different colored lines&#10;&#10;AI-generated content may be incorrect.">
+            <a:extLst>
+              <a:ext uri="{FF2B5EF4-FFF2-40B4-BE49-F238E27FC236}">
+                <a16:creationId xmlns:a16="http://schemas.microsoft.com/office/drawing/2014/main" id="{8086CFBC-C86E-D3BE-9048-2146511A5927}"/>
+              </a:ext>
+            </a:extLst>
+          </p:cNvPr>
+          <p:cNvPicPr>
+            <a:picLocks noChangeAspect="1"/>
+          </p:cNvPicPr>
+          <p:nvPr/>
+        </p:nvPicPr>
+        <p:blipFill>
+          <a:blip r:embed="rId3">
+            <a:extLst>
+              <a:ext uri="{28A0092B-C50C-407E-A947-70E740481C1C}">
+                <a14:useLocalDpi xmlns:a14="http://schemas.microsoft.com/office/drawing/2010/main" val="0"/>
+              </a:ext>
+            </a:extLst>
+          </a:blip>
+          <a:srcRect l="49" t="1" r="-613" b="-4"/>
+          <a:stretch>
+            <a:fillRect/>
+          </a:stretch>
+        </p:blipFill>
+        <p:spPr>
+          <a:xfrm>
+            <a:off x="5862522" y="3608833"/>
+            <a:ext cx="6076949" cy="2779776"/>
+          </a:xfrm>
+          <a:prstGeom prst="rect">
+            <a:avLst/>
+          </a:prstGeom>
+        </p:spPr>
+      </p:pic>
     </p:spTree>
     <p:extLst>
       <p:ext uri="{BB962C8B-B14F-4D97-AF65-F5344CB8AC3E}">
@@ -5169,6 +6890,14 @@
 <file path=ppt/slides/slide7.xml><?xml version="1.0" encoding="utf-8"?>
 <p:sld xmlns:a="http://schemas.openxmlformats.org/drawingml/2006/main" xmlns:r="http://schemas.openxmlformats.org/officeDocument/2006/relationships" xmlns:p="http://schemas.openxmlformats.org/presentationml/2006/main">
   <p:cSld>
+    <p:bg>
+      <p:bgPr>
+        <a:solidFill>
+          <a:schemeClr val="bg1"/>
+        </a:solidFill>
+        <a:effectLst/>
+      </p:bgPr>
+    </p:bg>
     <p:spTree>
       <p:nvGrpSpPr>
         <p:cNvPr id="1" name=""/>
@@ -5183,6 +6912,66 @@
           <a:chExt cx="0" cy="0"/>
         </a:xfrm>
       </p:grpSpPr>
+      <p:sp useBgFill="1">
+        <p:nvSpPr>
+          <p:cNvPr id="18" name="Rectangle 17">
+            <a:extLst>
+              <a:ext uri="{FF2B5EF4-FFF2-40B4-BE49-F238E27FC236}">
+                <a16:creationId xmlns:a16="http://schemas.microsoft.com/office/drawing/2014/main" id="{9E10BDB4-64F2-477D-A03B-9F8352D5E02E}"/>
+              </a:ext>
+              <a:ext uri="{C183D7F6-B498-43B3-948B-1728B52AA6E4}">
+                <adec:decorative xmlns:adec="http://schemas.microsoft.com/office/drawing/2017/decorative" val="1"/>
+              </a:ext>
+            </a:extLst>
+          </p:cNvPr>
+          <p:cNvSpPr>
+            <a:spLocks noGrp="1" noRot="1" noChangeAspect="1" noMove="1" noResize="1" noEditPoints="1" noAdjustHandles="1" noChangeArrowheads="1" noChangeShapeType="1" noTextEdit="1"/>
+          </p:cNvSpPr>
+          <p:nvPr>
+            <p:extLst>
+              <p:ext uri="{386F3935-93C4-4BCD-93E2-E3B085C9AB24}">
+                <p16:designElem xmlns:p16="http://schemas.microsoft.com/office/powerpoint/2015/main" val="1"/>
+              </p:ext>
+            </p:extLst>
+          </p:nvPr>
+        </p:nvSpPr>
+        <p:spPr>
+          <a:xfrm>
+            <a:off x="0" y="0"/>
+            <a:ext cx="12188952" cy="6857995"/>
+          </a:xfrm>
+          <a:prstGeom prst="rect">
+            <a:avLst/>
+          </a:prstGeom>
+          <a:ln>
+            <a:noFill/>
+          </a:ln>
+        </p:spPr>
+        <p:style>
+          <a:lnRef idx="2">
+            <a:schemeClr val="accent1">
+              <a:shade val="50000"/>
+            </a:schemeClr>
+          </a:lnRef>
+          <a:fillRef idx="1">
+            <a:schemeClr val="accent1"/>
+          </a:fillRef>
+          <a:effectRef idx="0">
+            <a:schemeClr val="accent1"/>
+          </a:effectRef>
+          <a:fontRef idx="minor">
+            <a:schemeClr val="lt1"/>
+          </a:fontRef>
+        </p:style>
+        <p:txBody>
+          <a:bodyPr rtlCol="0" anchor="ctr"/>
+          <a:lstStyle/>
+          <a:p>
+            <a:pPr algn="ctr"/>
+            <a:endParaRPr lang="en-US"/>
+          </a:p>
+        </p:txBody>
+      </p:sp>
       <p:sp>
         <p:nvSpPr>
           <p:cNvPr id="2" name="Title 1">
@@ -5199,19 +6988,155 @@
             <p:ph type="title"/>
           </p:nvPr>
         </p:nvSpPr>
-        <p:spPr/>
-        <p:txBody>
-          <a:bodyPr/>
-          <a:lstStyle/>
-          <a:p>
-            <a:r>
-              <a:rPr lang="en-US" dirty="0"/>
-              <a:t>ML Approach: Anomaly Detection</a:t>
-            </a:r>
-            <a:endParaRPr lang="ru-RU" dirty="0"/>
-          </a:p>
-        </p:txBody>
-      </p:sp>
+        <p:spPr>
+          <a:xfrm>
+            <a:off x="521208" y="978408"/>
+            <a:ext cx="5020056" cy="2368296"/>
+          </a:xfrm>
+        </p:spPr>
+        <p:txBody>
+          <a:bodyPr>
+            <a:normAutofit/>
+          </a:bodyPr>
+          <a:lstStyle/>
+          <a:p>
+            <a:r>
+              <a:rPr lang="en-US"/>
+              <a:t>Smart Detection System</a:t>
+            </a:r>
+            <a:endParaRPr lang="ru-RU"/>
+          </a:p>
+        </p:txBody>
+      </p:sp>
+      <p:sp>
+        <p:nvSpPr>
+          <p:cNvPr id="19" name="Rectangle 18">
+            <a:extLst>
+              <a:ext uri="{FF2B5EF4-FFF2-40B4-BE49-F238E27FC236}">
+                <a16:creationId xmlns:a16="http://schemas.microsoft.com/office/drawing/2014/main" id="{C7C5FE1C-310B-4F6B-A44A-BC43430A2C81}"/>
+              </a:ext>
+              <a:ext uri="{C183D7F6-B498-43B3-948B-1728B52AA6E4}">
+                <adec:decorative xmlns:adec="http://schemas.microsoft.com/office/drawing/2017/decorative" val="1"/>
+              </a:ext>
+            </a:extLst>
+          </p:cNvPr>
+          <p:cNvSpPr>
+            <a:spLocks noGrp="1" noRot="1" noChangeAspect="1" noMove="1" noResize="1" noEditPoints="1" noAdjustHandles="1" noChangeArrowheads="1" noChangeShapeType="1" noTextEdit="1"/>
+          </p:cNvSpPr>
+          <p:nvPr>
+            <p:extLst>
+              <p:ext uri="{386F3935-93C4-4BCD-93E2-E3B085C9AB24}">
+                <p16:designElem xmlns:p16="http://schemas.microsoft.com/office/powerpoint/2015/main" val="1"/>
+              </p:ext>
+            </p:extLst>
+          </p:nvPr>
+        </p:nvSpPr>
+        <p:spPr>
+          <a:xfrm>
+            <a:off x="517870" y="508090"/>
+            <a:ext cx="5021183" cy="149279"/>
+          </a:xfrm>
+          <a:prstGeom prst="rect">
+            <a:avLst/>
+          </a:prstGeom>
+          <a:solidFill>
+            <a:schemeClr val="tx1"/>
+          </a:solidFill>
+          <a:ln>
+            <a:noFill/>
+          </a:ln>
+        </p:spPr>
+        <p:style>
+          <a:lnRef idx="2">
+            <a:schemeClr val="accent1">
+              <a:shade val="50000"/>
+            </a:schemeClr>
+          </a:lnRef>
+          <a:fillRef idx="1">
+            <a:schemeClr val="accent1"/>
+          </a:fillRef>
+          <a:effectRef idx="0">
+            <a:schemeClr val="accent1"/>
+          </a:effectRef>
+          <a:fontRef idx="minor">
+            <a:schemeClr val="lt1"/>
+          </a:fontRef>
+        </p:style>
+        <p:txBody>
+          <a:bodyPr rtlCol="0" anchor="ctr"/>
+          <a:lstStyle/>
+          <a:p>
+            <a:pPr algn="ctr"/>
+            <a:endParaRPr lang="en-US"/>
+          </a:p>
+        </p:txBody>
+      </p:sp>
+      <p:pic>
+        <p:nvPicPr>
+          <p:cNvPr id="7" name="Picture 6">
+            <a:extLst>
+              <a:ext uri="{FF2B5EF4-FFF2-40B4-BE49-F238E27FC236}">
+                <a16:creationId xmlns:a16="http://schemas.microsoft.com/office/drawing/2014/main" id="{04F371B0-159B-E1EE-5481-943BD1D9DF3F}"/>
+              </a:ext>
+            </a:extLst>
+          </p:cNvPr>
+          <p:cNvPicPr>
+            <a:picLocks noChangeAspect="1"/>
+          </p:cNvPicPr>
+          <p:nvPr/>
+        </p:nvPicPr>
+        <p:blipFill>
+          <a:blip r:embed="rId2"/>
+          <a:stretch>
+            <a:fillRect/>
+          </a:stretch>
+        </p:blipFill>
+        <p:spPr>
+          <a:xfrm>
+            <a:off x="6662166" y="653645"/>
+            <a:ext cx="5011957" cy="2505978"/>
+          </a:xfrm>
+          <a:prstGeom prst="rect">
+            <a:avLst/>
+          </a:prstGeom>
+        </p:spPr>
+      </p:pic>
+      <p:pic>
+        <p:nvPicPr>
+          <p:cNvPr id="5" name="Picture 4" descr="A graph of a person and person&#10;&#10;AI-generated content may be incorrect.">
+            <a:extLst>
+              <a:ext uri="{FF2B5EF4-FFF2-40B4-BE49-F238E27FC236}">
+                <a16:creationId xmlns:a16="http://schemas.microsoft.com/office/drawing/2014/main" id="{1A278708-D44D-3972-30B8-E2AEC265684B}"/>
+              </a:ext>
+            </a:extLst>
+          </p:cNvPr>
+          <p:cNvPicPr>
+            <a:picLocks noChangeAspect="1"/>
+          </p:cNvPicPr>
+          <p:nvPr/>
+        </p:nvPicPr>
+        <p:blipFill>
+          <a:blip r:embed="rId3">
+            <a:extLst>
+              <a:ext uri="{28A0092B-C50C-407E-A947-70E740481C1C}">
+                <a14:useLocalDpi xmlns:a14="http://schemas.microsoft.com/office/drawing/2010/main" val="0"/>
+              </a:ext>
+            </a:extLst>
+          </a:blip>
+          <a:stretch>
+            <a:fillRect/>
+          </a:stretch>
+        </p:blipFill>
+        <p:spPr>
+          <a:xfrm>
+            <a:off x="508644" y="3918051"/>
+            <a:ext cx="5021183" cy="2058684"/>
+          </a:xfrm>
+          <a:prstGeom prst="rect">
+            <a:avLst/>
+          </a:prstGeom>
+        </p:spPr>
+      </p:pic>
       <p:sp>
         <p:nvSpPr>
           <p:cNvPr id="3" name="Content Placeholder 2">
@@ -5228,42 +7153,28 @@
             <p:ph idx="1"/>
           </p:nvPr>
         </p:nvSpPr>
-        <p:spPr/>
-        <p:txBody>
-          <a:bodyPr/>
-          <a:lstStyle/>
-          <a:p>
-            <a:r>
-              <a:rPr lang="en-US" dirty="0"/>
-              <a:t>Autoencoder architecture implemented with </a:t>
-            </a:r>
-            <a:r>
-              <a:rPr lang="en-US" dirty="0" err="1"/>
-              <a:t>PyTorch</a:t>
-            </a:r>
-            <a:r>
-              <a:rPr lang="en-US" dirty="0"/>
-              <a:t> to identify unusual consumption patterns</a:t>
-            </a:r>
-          </a:p>
-          <a:p>
-            <a:r>
-              <a:rPr lang="en-US" dirty="0"/>
-              <a:t>Separate models trained for each ACORN demographic group</a:t>
-            </a:r>
-          </a:p>
-          <a:p>
-            <a:r>
-              <a:rPr lang="en-US" dirty="0"/>
-              <a:t>System incorporates temporal and environmental factors for context-aware detection</a:t>
-            </a:r>
-          </a:p>
-          <a:p>
-            <a:r>
-              <a:rPr lang="en-US" dirty="0"/>
-              <a:t>Unsupervised learning approach enables adaptation to new households [Insert ml_plot_dark.png]</a:t>
-            </a:r>
-            <a:endParaRPr lang="ru-RU" dirty="0"/>
+        <p:spPr>
+          <a:xfrm>
+            <a:off x="6665976" y="3557016"/>
+            <a:ext cx="5010912" cy="2798064"/>
+          </a:xfrm>
+        </p:spPr>
+        <p:txBody>
+          <a:bodyPr anchor="b">
+            <a:normAutofit/>
+          </a:bodyPr>
+          <a:lstStyle/>
+          <a:p>
+            <a:r>
+              <a:rPr lang="en-US"/>
+              <a:t>Our AI learns what "normal" looks like for each household and flags unusual patterns. This catches faulty appliances before they break, spots behavior changes, or identifies potential energy theft.</a:t>
+            </a:r>
+          </a:p>
+          <a:p>
+            <a:r>
+              <a:rPr lang="en-US"/>
+              <a:t>The system accounts for household types and external factors, so it doesn't flag every party or vacation as an anomaly.</a:t>
+            </a:r>
           </a:p>
         </p:txBody>
       </p:sp>
@@ -5283,6 +7194,14 @@
 <file path=ppt/slides/slide8.xml><?xml version="1.0" encoding="utf-8"?>
 <p:sld xmlns:a="http://schemas.openxmlformats.org/drawingml/2006/main" xmlns:r="http://schemas.openxmlformats.org/officeDocument/2006/relationships" xmlns:p="http://schemas.openxmlformats.org/presentationml/2006/main">
   <p:cSld>
+    <p:bg>
+      <p:bgPr>
+        <a:solidFill>
+          <a:schemeClr val="bg1"/>
+        </a:solidFill>
+        <a:effectLst/>
+      </p:bgPr>
+    </p:bg>
     <p:spTree>
       <p:nvGrpSpPr>
         <p:cNvPr id="1" name=""/>
@@ -5297,11 +7216,427 @@
           <a:chExt cx="0" cy="0"/>
         </a:xfrm>
       </p:grpSpPr>
+      <p:sp useBgFill="1">
+        <p:nvSpPr>
+          <p:cNvPr id="24" name="Rectangle 23">
+            <a:extLst>
+              <a:ext uri="{FF2B5EF4-FFF2-40B4-BE49-F238E27FC236}">
+                <a16:creationId xmlns:a16="http://schemas.microsoft.com/office/drawing/2014/main" id="{34C0330F-1D4F-4552-B799-615DD237B6DE}"/>
+              </a:ext>
+              <a:ext uri="{C183D7F6-B498-43B3-948B-1728B52AA6E4}">
+                <adec:decorative xmlns:adec="http://schemas.microsoft.com/office/drawing/2017/decorative" val="1"/>
+              </a:ext>
+            </a:extLst>
+          </p:cNvPr>
+          <p:cNvSpPr>
+            <a:spLocks noGrp="1" noRot="1" noChangeAspect="1" noMove="1" noResize="1" noEditPoints="1" noAdjustHandles="1" noChangeArrowheads="1" noChangeShapeType="1" noTextEdit="1"/>
+          </p:cNvSpPr>
+          <p:nvPr>
+            <p:extLst>
+              <p:ext uri="{386F3935-93C4-4BCD-93E2-E3B085C9AB24}">
+                <p16:designElem xmlns:p16="http://schemas.microsoft.com/office/powerpoint/2015/main" val="1"/>
+              </p:ext>
+            </p:extLst>
+          </p:nvPr>
+        </p:nvSpPr>
+        <p:spPr>
+          <a:xfrm>
+            <a:off x="0" y="0"/>
+            <a:ext cx="12188952" cy="6857995"/>
+          </a:xfrm>
+          <a:prstGeom prst="rect">
+            <a:avLst/>
+          </a:prstGeom>
+          <a:ln>
+            <a:noFill/>
+          </a:ln>
+        </p:spPr>
+        <p:style>
+          <a:lnRef idx="2">
+            <a:schemeClr val="accent1">
+              <a:shade val="50000"/>
+            </a:schemeClr>
+          </a:lnRef>
+          <a:fillRef idx="1">
+            <a:schemeClr val="accent1"/>
+          </a:fillRef>
+          <a:effectRef idx="0">
+            <a:schemeClr val="accent1"/>
+          </a:effectRef>
+          <a:fontRef idx="minor">
+            <a:schemeClr val="lt1"/>
+          </a:fontRef>
+        </p:style>
+        <p:txBody>
+          <a:bodyPr rtlCol="0" anchor="ctr"/>
+          <a:lstStyle/>
+          <a:p>
+            <a:pPr algn="ctr"/>
+            <a:endParaRPr lang="en-US" dirty="0"/>
+          </a:p>
+        </p:txBody>
+      </p:sp>
       <p:sp>
         <p:nvSpPr>
           <p:cNvPr id="2" name="Title 1">
             <a:extLst>
               <a:ext uri="{FF2B5EF4-FFF2-40B4-BE49-F238E27FC236}">
+                <a16:creationId xmlns:a16="http://schemas.microsoft.com/office/drawing/2014/main" id="{BFCBCDC3-DAE3-6E2C-3246-C627DB8D432E}"/>
+              </a:ext>
+            </a:extLst>
+          </p:cNvPr>
+          <p:cNvSpPr>
+            <a:spLocks noGrp="1"/>
+          </p:cNvSpPr>
+          <p:nvPr>
+            <p:ph type="title"/>
+          </p:nvPr>
+        </p:nvSpPr>
+        <p:spPr>
+          <a:xfrm>
+            <a:off x="521208" y="978408"/>
+            <a:ext cx="6300216" cy="1463040"/>
+          </a:xfrm>
+        </p:spPr>
+        <p:txBody>
+          <a:bodyPr>
+            <a:normAutofit/>
+          </a:bodyPr>
+          <a:lstStyle/>
+          <a:p>
+            <a:r>
+              <a:rPr lang="en-US"/>
+              <a:t>How our AI works</a:t>
+            </a:r>
+            <a:endParaRPr lang="ru-RU"/>
+          </a:p>
+        </p:txBody>
+      </p:sp>
+      <p:sp>
+        <p:nvSpPr>
+          <p:cNvPr id="25" name="Rectangle 24">
+            <a:extLst>
+              <a:ext uri="{FF2B5EF4-FFF2-40B4-BE49-F238E27FC236}">
+                <a16:creationId xmlns:a16="http://schemas.microsoft.com/office/drawing/2014/main" id="{92BE0106-0C20-465B-A1BE-0BAC2737B1AD}"/>
+              </a:ext>
+              <a:ext uri="{C183D7F6-B498-43B3-948B-1728B52AA6E4}">
+                <adec:decorative xmlns:adec="http://schemas.microsoft.com/office/drawing/2017/decorative" val="1"/>
+              </a:ext>
+            </a:extLst>
+          </p:cNvPr>
+          <p:cNvSpPr>
+            <a:spLocks noGrp="1" noRot="1" noChangeAspect="1" noMove="1" noResize="1" noEditPoints="1" noAdjustHandles="1" noChangeArrowheads="1" noChangeShapeType="1" noTextEdit="1"/>
+          </p:cNvSpPr>
+          <p:nvPr>
+            <p:extLst>
+              <p:ext uri="{386F3935-93C4-4BCD-93E2-E3B085C9AB24}">
+                <p16:designElem xmlns:p16="http://schemas.microsoft.com/office/powerpoint/2015/main" val="1"/>
+              </p:ext>
+            </p:extLst>
+          </p:nvPr>
+        </p:nvSpPr>
+        <p:spPr>
+          <a:xfrm>
+            <a:off x="517869" y="508090"/>
+            <a:ext cx="6281928" cy="149279"/>
+          </a:xfrm>
+          <a:prstGeom prst="rect">
+            <a:avLst/>
+          </a:prstGeom>
+          <a:solidFill>
+            <a:schemeClr val="tx1"/>
+          </a:solidFill>
+          <a:ln>
+            <a:noFill/>
+          </a:ln>
+        </p:spPr>
+        <p:style>
+          <a:lnRef idx="2">
+            <a:schemeClr val="accent1">
+              <a:shade val="50000"/>
+            </a:schemeClr>
+          </a:lnRef>
+          <a:fillRef idx="1">
+            <a:schemeClr val="accent1"/>
+          </a:fillRef>
+          <a:effectRef idx="0">
+            <a:schemeClr val="accent1"/>
+          </a:effectRef>
+          <a:fontRef idx="minor">
+            <a:schemeClr val="lt1"/>
+          </a:fontRef>
+        </p:style>
+        <p:txBody>
+          <a:bodyPr rtlCol="0" anchor="ctr"/>
+          <a:lstStyle/>
+          <a:p>
+            <a:pPr algn="ctr"/>
+            <a:endParaRPr lang="en-US"/>
+          </a:p>
+        </p:txBody>
+      </p:sp>
+      <p:sp>
+        <p:nvSpPr>
+          <p:cNvPr id="3" name="Content Placeholder 2">
+            <a:extLst>
+              <a:ext uri="{FF2B5EF4-FFF2-40B4-BE49-F238E27FC236}">
+                <a16:creationId xmlns:a16="http://schemas.microsoft.com/office/drawing/2014/main" id="{EDECAF19-B748-366B-C883-874DFA464A2A}"/>
+              </a:ext>
+            </a:extLst>
+          </p:cNvPr>
+          <p:cNvSpPr>
+            <a:spLocks noGrp="1"/>
+          </p:cNvSpPr>
+          <p:nvPr>
+            <p:ph idx="1"/>
+          </p:nvPr>
+        </p:nvSpPr>
+        <p:spPr>
+          <a:xfrm>
+            <a:off x="521208" y="2578608"/>
+            <a:ext cx="6300216" cy="3767328"/>
+          </a:xfrm>
+        </p:spPr>
+        <p:txBody>
+          <a:bodyPr>
+            <a:normAutofit/>
+          </a:bodyPr>
+          <a:lstStyle/>
+          <a:p>
+            <a:pPr marL="0" indent="0">
+              <a:lnSpc>
+                <a:spcPct val="100000"/>
+              </a:lnSpc>
+              <a:buNone/>
+            </a:pPr>
+            <a:r>
+              <a:rPr lang="en-US" sz="1300"/>
+              <a:t>Our anomaly detection system uses a neural network architecture called an autoencoder that works in three key steps:</a:t>
+            </a:r>
+          </a:p>
+          <a:p>
+            <a:pPr marL="342900" indent="-342900">
+              <a:lnSpc>
+                <a:spcPct val="100000"/>
+              </a:lnSpc>
+              <a:buFont typeface="+mj-lt"/>
+              <a:buAutoNum type="arabicPeriod"/>
+            </a:pPr>
+            <a:r>
+              <a:rPr lang="en-US" sz="1300"/>
+              <a:t>Learning Normal Patterns: The autoencoder first analyzes thousands of daily energy consumption profiles from households within the same demographic group.</a:t>
+            </a:r>
+          </a:p>
+          <a:p>
+            <a:pPr marL="342900" indent="-342900">
+              <a:lnSpc>
+                <a:spcPct val="100000"/>
+              </a:lnSpc>
+              <a:buFont typeface="+mj-lt"/>
+              <a:buAutoNum type="arabicPeriod"/>
+            </a:pPr>
+            <a:r>
+              <a:rPr lang="en-US" sz="1300"/>
+              <a:t>Encoding-Decoding Process: It compresses each 48-point consumption pattern (representing half-hourly readings) into a compact 2-dimensional representation before reconstructing it. When patterns don't reconstruct well, they likely represent anomalies.</a:t>
+            </a:r>
+          </a:p>
+          <a:p>
+            <a:pPr marL="342900" indent="-342900">
+              <a:lnSpc>
+                <a:spcPct val="100000"/>
+              </a:lnSpc>
+              <a:buFont typeface="+mj-lt"/>
+              <a:buAutoNum type="arabicPeriod"/>
+            </a:pPr>
+            <a:r>
+              <a:rPr lang="en-US" sz="1300"/>
+              <a:t>Context-Aware Detection: Our model incorporates household context (day of week, season, temperature) to distinguish between normal seasonal variations and true anomalies.</a:t>
+            </a:r>
+          </a:p>
+          <a:p>
+            <a:pPr marL="0" indent="0">
+              <a:lnSpc>
+                <a:spcPct val="100000"/>
+              </a:lnSpc>
+              <a:buNone/>
+            </a:pPr>
+            <a:r>
+              <a:rPr lang="en-US" sz="1300"/>
+              <a:t>This approach enables early detection of unusual consumption patterns that may indicate appliance faults, energy theft, or significant behavior changes, with separate models tailored to each demographic group's unique usage profiles.</a:t>
+            </a:r>
+            <a:endParaRPr lang="ru-RU" sz="1300"/>
+          </a:p>
+        </p:txBody>
+      </p:sp>
+      <p:pic>
+        <p:nvPicPr>
+          <p:cNvPr id="4" name="Graphic 3">
+            <a:extLst>
+              <a:ext uri="{FF2B5EF4-FFF2-40B4-BE49-F238E27FC236}">
+                <a16:creationId xmlns:a16="http://schemas.microsoft.com/office/drawing/2014/main" id="{7198B129-5017-C4D1-94E2-947A73BA398F}"/>
+              </a:ext>
+            </a:extLst>
+          </p:cNvPr>
+          <p:cNvPicPr>
+            <a:picLocks noChangeAspect="1"/>
+          </p:cNvPicPr>
+          <p:nvPr/>
+        </p:nvPicPr>
+        <p:blipFill>
+          <a:blip r:embed="rId2">
+            <a:extLst>
+              <a:ext uri="{96DAC541-7B7A-43D3-8B79-37D633B846F1}">
+                <asvg:svgBlip xmlns:asvg="http://schemas.microsoft.com/office/drawing/2016/SVG/main" r:embed="rId3"/>
+              </a:ext>
+            </a:extLst>
+          </a:blip>
+          <a:stretch>
+            <a:fillRect/>
+          </a:stretch>
+        </p:blipFill>
+        <p:spPr>
+          <a:xfrm>
+            <a:off x="7653817" y="643128"/>
+            <a:ext cx="4014216" cy="2676144"/>
+          </a:xfrm>
+          <a:prstGeom prst="rect">
+            <a:avLst/>
+          </a:prstGeom>
+        </p:spPr>
+      </p:pic>
+      <p:pic>
+        <p:nvPicPr>
+          <p:cNvPr id="5" name="Picture 4">
+            <a:extLst>
+              <a:ext uri="{FF2B5EF4-FFF2-40B4-BE49-F238E27FC236}">
+                <a16:creationId xmlns:a16="http://schemas.microsoft.com/office/drawing/2014/main" id="{736E7033-82A1-9EB1-CEDD-0DF5E92A4235}"/>
+              </a:ext>
+            </a:extLst>
+          </p:cNvPr>
+          <p:cNvPicPr>
+            <a:picLocks noChangeAspect="1"/>
+          </p:cNvPicPr>
+          <p:nvPr/>
+        </p:nvPicPr>
+        <p:blipFill>
+          <a:blip r:embed="rId4"/>
+          <a:stretch>
+            <a:fillRect/>
+          </a:stretch>
+        </p:blipFill>
+        <p:spPr>
+          <a:xfrm>
+            <a:off x="7653817" y="4259434"/>
+            <a:ext cx="4014216" cy="2077357"/>
+          </a:xfrm>
+          <a:prstGeom prst="rect">
+            <a:avLst/>
+          </a:prstGeom>
+        </p:spPr>
+      </p:pic>
+    </p:spTree>
+    <p:extLst>
+      <p:ext uri="{BB962C8B-B14F-4D97-AF65-F5344CB8AC3E}">
+        <p14:creationId xmlns:p14="http://schemas.microsoft.com/office/powerpoint/2010/main" val="1454717579"/>
+      </p:ext>
+    </p:extLst>
+  </p:cSld>
+  <p:clrMapOvr>
+    <a:masterClrMapping/>
+  </p:clrMapOvr>
+</p:sld>
+</file>
+
+<file path=ppt/slides/slide9.xml><?xml version="1.0" encoding="utf-8"?>
+<p:sld xmlns:a="http://schemas.openxmlformats.org/drawingml/2006/main" xmlns:r="http://schemas.openxmlformats.org/officeDocument/2006/relationships" xmlns:p="http://schemas.openxmlformats.org/presentationml/2006/main">
+  <p:cSld>
+    <p:bg>
+      <p:bgPr>
+        <a:solidFill>
+          <a:schemeClr val="bg1"/>
+        </a:solidFill>
+        <a:effectLst/>
+      </p:bgPr>
+    </p:bg>
+    <p:spTree>
+      <p:nvGrpSpPr>
+        <p:cNvPr id="1" name=""/>
+        <p:cNvGrpSpPr/>
+        <p:nvPr/>
+      </p:nvGrpSpPr>
+      <p:grpSpPr>
+        <a:xfrm>
+          <a:off x="0" y="0"/>
+          <a:ext cx="0" cy="0"/>
+          <a:chOff x="0" y="0"/>
+          <a:chExt cx="0" cy="0"/>
+        </a:xfrm>
+      </p:grpSpPr>
+      <p:sp useBgFill="1">
+        <p:nvSpPr>
+          <p:cNvPr id="24" name="Rectangle 23">
+            <a:extLst>
+              <a:ext uri="{FF2B5EF4-FFF2-40B4-BE49-F238E27FC236}">
+                <a16:creationId xmlns:a16="http://schemas.microsoft.com/office/drawing/2014/main" id="{9E10BDB4-64F2-477D-A03B-9F8352D5E02E}"/>
+              </a:ext>
+              <a:ext uri="{C183D7F6-B498-43B3-948B-1728B52AA6E4}">
+                <adec:decorative xmlns:adec="http://schemas.microsoft.com/office/drawing/2017/decorative" val="1"/>
+              </a:ext>
+            </a:extLst>
+          </p:cNvPr>
+          <p:cNvSpPr>
+            <a:spLocks noGrp="1" noRot="1" noChangeAspect="1" noMove="1" noResize="1" noEditPoints="1" noAdjustHandles="1" noChangeArrowheads="1" noChangeShapeType="1" noTextEdit="1"/>
+          </p:cNvSpPr>
+          <p:nvPr>
+            <p:extLst>
+              <p:ext uri="{386F3935-93C4-4BCD-93E2-E3B085C9AB24}">
+                <p16:designElem xmlns:p16="http://schemas.microsoft.com/office/powerpoint/2015/main" val="1"/>
+              </p:ext>
+            </p:extLst>
+          </p:nvPr>
+        </p:nvSpPr>
+        <p:spPr>
+          <a:xfrm>
+            <a:off x="0" y="0"/>
+            <a:ext cx="12188952" cy="6857995"/>
+          </a:xfrm>
+          <a:prstGeom prst="rect">
+            <a:avLst/>
+          </a:prstGeom>
+          <a:ln>
+            <a:noFill/>
+          </a:ln>
+        </p:spPr>
+        <p:style>
+          <a:lnRef idx="2">
+            <a:schemeClr val="accent1">
+              <a:shade val="50000"/>
+            </a:schemeClr>
+          </a:lnRef>
+          <a:fillRef idx="1">
+            <a:schemeClr val="accent1"/>
+          </a:fillRef>
+          <a:effectRef idx="0">
+            <a:schemeClr val="accent1"/>
+          </a:effectRef>
+          <a:fontRef idx="minor">
+            <a:schemeClr val="lt1"/>
+          </a:fontRef>
+        </p:style>
+        <p:txBody>
+          <a:bodyPr rtlCol="0" anchor="ctr"/>
+          <a:lstStyle/>
+          <a:p>
+            <a:pPr algn="ctr"/>
+            <a:endParaRPr lang="en-US"/>
+          </a:p>
+        </p:txBody>
+      </p:sp>
+      <p:sp>
+        <p:nvSpPr>
+          <p:cNvPr id="2" name="Title 1">
+            <a:extLst>
+              <a:ext uri="{FF2B5EF4-FFF2-40B4-BE49-F238E27FC236}">
                 <a16:creationId xmlns:a16="http://schemas.microsoft.com/office/drawing/2014/main" id="{68B6B5B7-C62D-AD93-6B9C-B5C48841B923}"/>
               </a:ext>
             </a:extLst>
@@ -5313,19 +7648,211 @@
             <p:ph type="title"/>
           </p:nvPr>
         </p:nvSpPr>
-        <p:spPr/>
-        <p:txBody>
-          <a:bodyPr/>
-          <a:lstStyle/>
-          <a:p>
-            <a:r>
-              <a:rPr lang="en-US" dirty="0"/>
-              <a:t>Technical Architecture</a:t>
-            </a:r>
-            <a:endParaRPr lang="ru-RU" dirty="0"/>
-          </a:p>
-        </p:txBody>
-      </p:sp>
+        <p:spPr>
+          <a:xfrm>
+            <a:off x="521208" y="978408"/>
+            <a:ext cx="6300216" cy="1325880"/>
+          </a:xfrm>
+        </p:spPr>
+        <p:txBody>
+          <a:bodyPr>
+            <a:normAutofit/>
+          </a:bodyPr>
+          <a:lstStyle/>
+          <a:p>
+            <a:r>
+              <a:rPr lang="en-US"/>
+              <a:t>Technical Foundation</a:t>
+            </a:r>
+            <a:endParaRPr lang="ru-RU"/>
+          </a:p>
+        </p:txBody>
+      </p:sp>
+      <p:sp>
+        <p:nvSpPr>
+          <p:cNvPr id="25" name="Rectangle 24">
+            <a:extLst>
+              <a:ext uri="{FF2B5EF4-FFF2-40B4-BE49-F238E27FC236}">
+                <a16:creationId xmlns:a16="http://schemas.microsoft.com/office/drawing/2014/main" id="{887F59F2-5FBC-40CD-AD35-376AECE49EA6}"/>
+              </a:ext>
+              <a:ext uri="{C183D7F6-B498-43B3-948B-1728B52AA6E4}">
+                <adec:decorative xmlns:adec="http://schemas.microsoft.com/office/drawing/2017/decorative" val="1"/>
+              </a:ext>
+            </a:extLst>
+          </p:cNvPr>
+          <p:cNvSpPr>
+            <a:spLocks noGrp="1" noRot="1" noChangeAspect="1" noMove="1" noResize="1" noEditPoints="1" noAdjustHandles="1" noChangeArrowheads="1" noChangeShapeType="1" noTextEdit="1"/>
+          </p:cNvSpPr>
+          <p:nvPr>
+            <p:extLst>
+              <p:ext uri="{386F3935-93C4-4BCD-93E2-E3B085C9AB24}">
+                <p16:designElem xmlns:p16="http://schemas.microsoft.com/office/powerpoint/2015/main" val="1"/>
+              </p:ext>
+            </p:extLst>
+          </p:nvPr>
+        </p:nvSpPr>
+        <p:spPr>
+          <a:xfrm>
+            <a:off x="517868" y="508090"/>
+            <a:ext cx="6281928" cy="149279"/>
+          </a:xfrm>
+          <a:prstGeom prst="rect">
+            <a:avLst/>
+          </a:prstGeom>
+          <a:solidFill>
+            <a:schemeClr val="tx1"/>
+          </a:solidFill>
+          <a:ln>
+            <a:noFill/>
+          </a:ln>
+        </p:spPr>
+        <p:style>
+          <a:lnRef idx="2">
+            <a:schemeClr val="accent1">
+              <a:shade val="50000"/>
+            </a:schemeClr>
+          </a:lnRef>
+          <a:fillRef idx="1">
+            <a:schemeClr val="accent1"/>
+          </a:fillRef>
+          <a:effectRef idx="0">
+            <a:schemeClr val="accent1"/>
+          </a:effectRef>
+          <a:fontRef idx="minor">
+            <a:schemeClr val="lt1"/>
+          </a:fontRef>
+        </p:style>
+        <p:txBody>
+          <a:bodyPr rtlCol="0" anchor="ctr"/>
+          <a:lstStyle/>
+          <a:p>
+            <a:pPr algn="ctr"/>
+            <a:endParaRPr lang="en-US"/>
+          </a:p>
+        </p:txBody>
+      </p:sp>
+      <p:sp>
+        <p:nvSpPr>
+          <p:cNvPr id="26" name="Rectangle 25">
+            <a:extLst>
+              <a:ext uri="{FF2B5EF4-FFF2-40B4-BE49-F238E27FC236}">
+                <a16:creationId xmlns:a16="http://schemas.microsoft.com/office/drawing/2014/main" id="{7271C494-8107-3D61-D611-4FBC7C22A2B8}"/>
+              </a:ext>
+              <a:ext uri="{C183D7F6-B498-43B3-948B-1728B52AA6E4}">
+                <adec:decorative xmlns:adec="http://schemas.microsoft.com/office/drawing/2017/decorative" val="1"/>
+              </a:ext>
+            </a:extLst>
+          </p:cNvPr>
+          <p:cNvSpPr>
+            <a:spLocks noGrp="1" noRot="1" noChangeAspect="1" noMove="1" noResize="1" noEditPoints="1" noAdjustHandles="1" noChangeArrowheads="1" noChangeShapeType="1" noTextEdit="1"/>
+          </p:cNvSpPr>
+          <p:nvPr>
+            <p:extLst>
+              <p:ext uri="{386F3935-93C4-4BCD-93E2-E3B085C9AB24}">
+                <p16:designElem xmlns:p16="http://schemas.microsoft.com/office/powerpoint/2015/main" val="1"/>
+              </p:ext>
+            </p:extLst>
+          </p:nvPr>
+        </p:nvSpPr>
+        <p:spPr>
+          <a:xfrm>
+            <a:off x="7513612" y="611650"/>
+            <a:ext cx="4160520" cy="45719"/>
+          </a:xfrm>
+          <a:prstGeom prst="rect">
+            <a:avLst/>
+          </a:prstGeom>
+          <a:solidFill>
+            <a:schemeClr val="tx1"/>
+          </a:solidFill>
+          <a:ln>
+            <a:noFill/>
+          </a:ln>
+        </p:spPr>
+        <p:style>
+          <a:lnRef idx="2">
+            <a:schemeClr val="accent1">
+              <a:shade val="50000"/>
+            </a:schemeClr>
+          </a:lnRef>
+          <a:fillRef idx="1">
+            <a:schemeClr val="accent1"/>
+          </a:fillRef>
+          <a:effectRef idx="0">
+            <a:schemeClr val="accent1"/>
+          </a:effectRef>
+          <a:fontRef idx="minor">
+            <a:schemeClr val="lt1"/>
+          </a:fontRef>
+        </p:style>
+        <p:txBody>
+          <a:bodyPr rtlCol="0" anchor="ctr"/>
+          <a:lstStyle/>
+          <a:p>
+            <a:pPr marL="0" marR="0" lvl="0" indent="0" algn="ctr" defTabSz="914400" rtl="0" eaLnBrk="1" fontAlgn="auto" latinLnBrk="0" hangingPunct="1">
+              <a:lnSpc>
+                <a:spcPct val="100000"/>
+              </a:lnSpc>
+              <a:spcBef>
+                <a:spcPts val="0"/>
+              </a:spcBef>
+              <a:spcAft>
+                <a:spcPts val="0"/>
+              </a:spcAft>
+              <a:buClrTx/>
+              <a:buSzTx/>
+              <a:buFontTx/>
+              <a:buNone/>
+              <a:tabLst/>
+              <a:defRPr/>
+            </a:pPr>
+            <a:endParaRPr kumimoji="0" lang="en-US" sz="1800" b="0" i="0" u="none" strike="noStrike" kern="1200" cap="none" spc="0" normalizeH="0" baseline="0" noProof="0">
+              <a:ln>
+                <a:noFill/>
+              </a:ln>
+              <a:solidFill>
+                <a:prstClr val="white"/>
+              </a:solidFill>
+              <a:effectLst/>
+              <a:uLnTx/>
+              <a:uFillTx/>
+              <a:latin typeface="Bierstadt"/>
+              <a:ea typeface="+mn-ea"/>
+              <a:cs typeface="+mn-cs"/>
+            </a:endParaRPr>
+          </a:p>
+        </p:txBody>
+      </p:sp>
+      <p:pic>
+        <p:nvPicPr>
+          <p:cNvPr id="7" name="Picture 6">
+            <a:extLst>
+              <a:ext uri="{FF2B5EF4-FFF2-40B4-BE49-F238E27FC236}">
+                <a16:creationId xmlns:a16="http://schemas.microsoft.com/office/drawing/2014/main" id="{4A7D9713-174A-56AF-A0A7-078AA04F2E5A}"/>
+              </a:ext>
+            </a:extLst>
+          </p:cNvPr>
+          <p:cNvPicPr>
+            <a:picLocks noChangeAspect="1"/>
+          </p:cNvPicPr>
+          <p:nvPr/>
+        </p:nvPicPr>
+        <p:blipFill>
+          <a:blip r:embed="rId2"/>
+          <a:stretch>
+            <a:fillRect/>
+          </a:stretch>
+        </p:blipFill>
+        <p:spPr>
+          <a:xfrm>
+            <a:off x="517866" y="2410897"/>
+            <a:ext cx="6995745" cy="3935106"/>
+          </a:xfrm>
+          <a:prstGeom prst="rect">
+            <a:avLst/>
+          </a:prstGeom>
+        </p:spPr>
+      </p:pic>
       <p:sp>
         <p:nvSpPr>
           <p:cNvPr id="3" name="Content Placeholder 2">
@@ -5342,52 +7869,26 @@
             <p:ph idx="1"/>
           </p:nvPr>
         </p:nvSpPr>
-        <p:spPr/>
-        <p:txBody>
-          <a:bodyPr/>
-          <a:lstStyle/>
-          <a:p>
-            <a:r>
-              <a:rPr lang="en-US" dirty="0"/>
-              <a:t>High-performance data pipeline utilizing Polars for rapid analysis</a:t>
-            </a:r>
-          </a:p>
-          <a:p>
-            <a:r>
-              <a:rPr lang="en-US" dirty="0"/>
-              <a:t>Interactive dashboard with </a:t>
-            </a:r>
-            <a:r>
-              <a:rPr lang="en-US" dirty="0" err="1"/>
-              <a:t>Streamlit</a:t>
-            </a:r>
-            <a:r>
-              <a:rPr lang="en-US" dirty="0"/>
-              <a:t> for user-friendly exploration</a:t>
-            </a:r>
-          </a:p>
-          <a:p>
-            <a:r>
-              <a:rPr lang="en-US" dirty="0"/>
-              <a:t>Optimized caching system for handling large datasets efficiently</a:t>
-            </a:r>
-          </a:p>
-          <a:p>
-            <a:r>
-              <a:rPr lang="en-US" dirty="0"/>
-              <a:t>Modular design allows for easy extension and feature addition</a:t>
-            </a:r>
-          </a:p>
-          <a:p>
-            <a:r>
-              <a:rPr lang="en-US" dirty="0" err="1"/>
-              <a:t>PyTorch</a:t>
-            </a:r>
-            <a:r>
-              <a:rPr lang="en-US" dirty="0"/>
-              <a:t>-based ML subsystem for advanced analytics</a:t>
-            </a:r>
-            <a:endParaRPr lang="ru-RU" dirty="0"/>
+        <p:spPr>
+          <a:xfrm>
+            <a:off x="7507224" y="1088136"/>
+            <a:ext cx="4160520" cy="5257800"/>
+          </a:xfrm>
+        </p:spPr>
+        <p:txBody>
+          <a:bodyPr>
+            <a:normAutofit/>
+          </a:bodyPr>
+          <a:lstStyle/>
+          <a:p>
+            <a:pPr marL="0" indent="0">
+              <a:buNone/>
+            </a:pPr>
+            <a:r>
+              <a:rPr lang="en-US"/>
+              <a:t>We prioritized speed and reliability. Our pipeline handles massive datasets quickly with smart caching for instant results. The machine learning components provide real-time insights while keeping the interface intuitive – no PhD required :). Every chart is explained how it works and what it shows. We also have “Interesting Insights” Section for each plot </a:t>
+            </a:r>
+            <a:endParaRPr lang="ru-RU"/>
           </a:p>
         </p:txBody>
       </p:sp>
@@ -5938,4 +8439,237 @@
     </a:ext>
   </a:extLst>
 </a:theme>
+</file>
+
+<file path=customXml/item1.xml><?xml version="1.0" encoding="utf-8"?>
+<p:properties xmlns:p="http://schemas.microsoft.com/office/2006/metadata/properties" xmlns:xsi="http://www.w3.org/2001/XMLSchema-instance" xmlns:pc="http://schemas.microsoft.com/office/infopath/2007/PartnerControls">
+  <documentManagement>
+    <_activity xmlns="0b6bae61-cbc4-483d-b8e2-ea5293709ed7" xsi:nil="true"/>
+  </documentManagement>
+</p:properties>
+</file>
+
+<file path=customXml/item2.xml><?xml version="1.0" encoding="utf-8"?>
+<?mso-contentType ?>
+<FormTemplates xmlns="http://schemas.microsoft.com/sharepoint/v3/contenttype/forms">
+  <Display>DocumentLibraryForm</Display>
+  <Edit>DocumentLibraryForm</Edit>
+  <New>DocumentLibraryForm</New>
+</FormTemplates>
+</file>
+
+<file path=customXml/item3.xml><?xml version="1.0" encoding="utf-8"?>
+<ct:contentTypeSchema xmlns:ct="http://schemas.microsoft.com/office/2006/metadata/contentType" xmlns:ma="http://schemas.microsoft.com/office/2006/metadata/properties/metaAttributes" ct:_="" ma:_="" ma:contentTypeName="Dokument" ma:contentTypeID="0x0101006F01FDACA741214F9734A1B6D812A1F3" ma:contentTypeVersion="9" ma:contentTypeDescription="Utwórz nowy dokument." ma:contentTypeScope="" ma:versionID="5cca1fddcfcabff89d48c70c16ce5a5f">
+  <xsd:schema xmlns:xsd="http://www.w3.org/2001/XMLSchema" xmlns:xs="http://www.w3.org/2001/XMLSchema" xmlns:p="http://schemas.microsoft.com/office/2006/metadata/properties" xmlns:ns3="0b6bae61-cbc4-483d-b8e2-ea5293709ed7" targetNamespace="http://schemas.microsoft.com/office/2006/metadata/properties" ma:root="true" ma:fieldsID="4aee38a27427e7b6f7ed39581e19ed95" ns3:_="">
+    <xsd:import namespace="0b6bae61-cbc4-483d-b8e2-ea5293709ed7"/>
+    <xsd:element name="properties">
+      <xsd:complexType>
+        <xsd:sequence>
+          <xsd:element name="documentManagement">
+            <xsd:complexType>
+              <xsd:all>
+                <xsd:element ref="ns3:MediaServiceMetadata" minOccurs="0"/>
+                <xsd:element ref="ns3:MediaServiceFastMetadata" minOccurs="0"/>
+                <xsd:element ref="ns3:MediaServiceSearchProperties" minOccurs="0"/>
+                <xsd:element ref="ns3:MediaServiceObjectDetectorVersions" minOccurs="0"/>
+                <xsd:element ref="ns3:_activity" minOccurs="0"/>
+                <xsd:element ref="ns3:MediaServiceDateTaken" minOccurs="0"/>
+                <xsd:element ref="ns3:MediaServiceSystemTags" minOccurs="0"/>
+                <xsd:element ref="ns3:MediaServiceGenerationTime" minOccurs="0"/>
+                <xsd:element ref="ns3:MediaServiceEventHashCode" minOccurs="0"/>
+              </xsd:all>
+            </xsd:complexType>
+          </xsd:element>
+        </xsd:sequence>
+      </xsd:complexType>
+    </xsd:element>
+  </xsd:schema>
+  <xsd:schema xmlns:xsd="http://www.w3.org/2001/XMLSchema" xmlns:xs="http://www.w3.org/2001/XMLSchema" xmlns:dms="http://schemas.microsoft.com/office/2006/documentManagement/types" xmlns:pc="http://schemas.microsoft.com/office/infopath/2007/PartnerControls" targetNamespace="0b6bae61-cbc4-483d-b8e2-ea5293709ed7" elementFormDefault="qualified">
+    <xsd:import namespace="http://schemas.microsoft.com/office/2006/documentManagement/types"/>
+    <xsd:import namespace="http://schemas.microsoft.com/office/infopath/2007/PartnerControls"/>
+    <xsd:element name="MediaServiceMetadata" ma:index="8" nillable="true" ma:displayName="MediaServiceMetadata" ma:hidden="true" ma:internalName="MediaServiceMetadata" ma:readOnly="true">
+      <xsd:simpleType>
+        <xsd:restriction base="dms:Note"/>
+      </xsd:simpleType>
+    </xsd:element>
+    <xsd:element name="MediaServiceFastMetadata" ma:index="9" nillable="true" ma:displayName="MediaServiceFastMetadata" ma:hidden="true" ma:internalName="MediaServiceFastMetadata" ma:readOnly="true">
+      <xsd:simpleType>
+        <xsd:restriction base="dms:Note"/>
+      </xsd:simpleType>
+    </xsd:element>
+    <xsd:element name="MediaServiceSearchProperties" ma:index="10" nillable="true" ma:displayName="MediaServiceSearchProperties" ma:hidden="true" ma:internalName="MediaServiceSearchProperties" ma:readOnly="true">
+      <xsd:simpleType>
+        <xsd:restriction base="dms:Note"/>
+      </xsd:simpleType>
+    </xsd:element>
+    <xsd:element name="MediaServiceObjectDetectorVersions" ma:index="11" nillable="true" ma:displayName="MediaServiceObjectDetectorVersions" ma:hidden="true" ma:indexed="true" ma:internalName="MediaServiceObjectDetectorVersions" ma:readOnly="true">
+      <xsd:simpleType>
+        <xsd:restriction base="dms:Text"/>
+      </xsd:simpleType>
+    </xsd:element>
+    <xsd:element name="_activity" ma:index="12" nillable="true" ma:displayName="_activity" ma:hidden="true" ma:internalName="_activity">
+      <xsd:simpleType>
+        <xsd:restriction base="dms:Note"/>
+      </xsd:simpleType>
+    </xsd:element>
+    <xsd:element name="MediaServiceDateTaken" ma:index="13" nillable="true" ma:displayName="MediaServiceDateTaken" ma:hidden="true" ma:indexed="true" ma:internalName="MediaServiceDateTaken" ma:readOnly="true">
+      <xsd:simpleType>
+        <xsd:restriction base="dms:Text"/>
+      </xsd:simpleType>
+    </xsd:element>
+    <xsd:element name="MediaServiceSystemTags" ma:index="14" nillable="true" ma:displayName="MediaServiceSystemTags" ma:hidden="true" ma:internalName="MediaServiceSystemTags" ma:readOnly="true">
+      <xsd:simpleType>
+        <xsd:restriction base="dms:Note"/>
+      </xsd:simpleType>
+    </xsd:element>
+    <xsd:element name="MediaServiceGenerationTime" ma:index="15" nillable="true" ma:displayName="MediaServiceGenerationTime" ma:hidden="true" ma:internalName="MediaServiceGenerationTime" ma:readOnly="true">
+      <xsd:simpleType>
+        <xsd:restriction base="dms:Text"/>
+      </xsd:simpleType>
+    </xsd:element>
+    <xsd:element name="MediaServiceEventHashCode" ma:index="16" nillable="true" ma:displayName="MediaServiceEventHashCode" ma:hidden="true" ma:internalName="MediaServiceEventHashCode" ma:readOnly="true">
+      <xsd:simpleType>
+        <xsd:restriction base="dms:Text"/>
+      </xsd:simpleType>
+    </xsd:element>
+  </xsd:schema>
+  <xsd:schema xmlns="http://schemas.openxmlformats.org/package/2006/metadata/core-properties" xmlns:xsd="http://www.w3.org/2001/XMLSchema" xmlns:xsi="http://www.w3.org/2001/XMLSchema-instance" xmlns:dc="http://purl.org/dc/elements/1.1/" xmlns:dcterms="http://purl.org/dc/terms/" xmlns:odoc="http://schemas.microsoft.com/internal/obd" targetNamespace="http://schemas.openxmlformats.org/package/2006/metadata/core-properties" elementFormDefault="qualified" attributeFormDefault="unqualified" blockDefault="#all">
+    <xsd:import namespace="http://purl.org/dc/elements/1.1/" schemaLocation="http://dublincore.org/schemas/xmls/qdc/2003/04/02/dc.xsd"/>
+    <xsd:import namespace="http://purl.org/dc/terms/" schemaLocation="http://dublincore.org/schemas/xmls/qdc/2003/04/02/dcterms.xsd"/>
+    <xsd:element name="coreProperties" type="CT_coreProperties"/>
+    <xsd:complexType name="CT_coreProperties">
+      <xsd:all>
+        <xsd:element ref="dc:creator" minOccurs="0" maxOccurs="1"/>
+        <xsd:element ref="dcterms:created" minOccurs="0" maxOccurs="1"/>
+        <xsd:element ref="dc:identifier" minOccurs="0" maxOccurs="1"/>
+        <xsd:element name="contentType" minOccurs="0" maxOccurs="1" type="xsd:string" ma:index="0" ma:displayName="Typ zawartości"/>
+        <xsd:element ref="dc:title" minOccurs="0" maxOccurs="1" ma:index="4" ma:displayName="Tytuł"/>
+        <xsd:element ref="dc:subject" minOccurs="0" maxOccurs="1"/>
+        <xsd:element ref="dc:description" minOccurs="0" maxOccurs="1"/>
+        <xsd:element name="keywords" minOccurs="0" maxOccurs="1" type="xsd:string"/>
+        <xsd:element ref="dc:language" minOccurs="0" maxOccurs="1"/>
+        <xsd:element name="category" minOccurs="0" maxOccurs="1" type="xsd:string"/>
+        <xsd:element name="version" minOccurs="0" maxOccurs="1" type="xsd:string"/>
+        <xsd:element name="revision" minOccurs="0" maxOccurs="1" type="xsd:string">
+          <xsd:annotation>
+            <xsd:documentation>
+                        This value indicates the number of saves or revisions. The application is responsible for updating this value after each revision.
+                    </xsd:documentation>
+          </xsd:annotation>
+        </xsd:element>
+        <xsd:element name="lastModifiedBy" minOccurs="0" maxOccurs="1" type="xsd:string"/>
+        <xsd:element ref="dcterms:modified" minOccurs="0" maxOccurs="1"/>
+        <xsd:element name="contentStatus" minOccurs="0" maxOccurs="1" type="xsd:string"/>
+      </xsd:all>
+    </xsd:complexType>
+  </xsd:schema>
+  <xs:schema xmlns:pc="http://schemas.microsoft.com/office/infopath/2007/PartnerControls" xmlns:xs="http://www.w3.org/2001/XMLSchema" targetNamespace="http://schemas.microsoft.com/office/infopath/2007/PartnerControls" elementFormDefault="qualified" attributeFormDefault="unqualified">
+    <xs:element name="Person">
+      <xs:complexType>
+        <xs:sequence>
+          <xs:element ref="pc:DisplayName" minOccurs="0"/>
+          <xs:element ref="pc:AccountId" minOccurs="0"/>
+          <xs:element ref="pc:AccountType" minOccurs="0"/>
+        </xs:sequence>
+      </xs:complexType>
+    </xs:element>
+    <xs:element name="DisplayName" type="xs:string"/>
+    <xs:element name="AccountId" type="xs:string"/>
+    <xs:element name="AccountType" type="xs:string"/>
+    <xs:element name="BDCAssociatedEntity">
+      <xs:complexType>
+        <xs:sequence>
+          <xs:element ref="pc:BDCEntity" minOccurs="0" maxOccurs="unbounded"/>
+        </xs:sequence>
+        <xs:attribute ref="pc:EntityNamespace"/>
+        <xs:attribute ref="pc:EntityName"/>
+        <xs:attribute ref="pc:SystemInstanceName"/>
+        <xs:attribute ref="pc:AssociationName"/>
+      </xs:complexType>
+    </xs:element>
+    <xs:attribute name="EntityNamespace" type="xs:string"/>
+    <xs:attribute name="EntityName" type="xs:string"/>
+    <xs:attribute name="SystemInstanceName" type="xs:string"/>
+    <xs:attribute name="AssociationName" type="xs:string"/>
+    <xs:element name="BDCEntity">
+      <xs:complexType>
+        <xs:sequence>
+          <xs:element ref="pc:EntityDisplayName" minOccurs="0"/>
+          <xs:element ref="pc:EntityInstanceReference" minOccurs="0"/>
+          <xs:element ref="pc:EntityId1" minOccurs="0"/>
+          <xs:element ref="pc:EntityId2" minOccurs="0"/>
+          <xs:element ref="pc:EntityId3" minOccurs="0"/>
+          <xs:element ref="pc:EntityId4" minOccurs="0"/>
+          <xs:element ref="pc:EntityId5" minOccurs="0"/>
+        </xs:sequence>
+      </xs:complexType>
+    </xs:element>
+    <xs:element name="EntityDisplayName" type="xs:string"/>
+    <xs:element name="EntityInstanceReference" type="xs:string"/>
+    <xs:element name="EntityId1" type="xs:string"/>
+    <xs:element name="EntityId2" type="xs:string"/>
+    <xs:element name="EntityId3" type="xs:string"/>
+    <xs:element name="EntityId4" type="xs:string"/>
+    <xs:element name="EntityId5" type="xs:string"/>
+    <xs:element name="Terms">
+      <xs:complexType>
+        <xs:sequence>
+          <xs:element ref="pc:TermInfo" minOccurs="0" maxOccurs="unbounded"/>
+        </xs:sequence>
+      </xs:complexType>
+    </xs:element>
+    <xs:element name="TermInfo">
+      <xs:complexType>
+        <xs:sequence>
+          <xs:element ref="pc:TermName" minOccurs="0"/>
+          <xs:element ref="pc:TermId" minOccurs="0"/>
+        </xs:sequence>
+      </xs:complexType>
+    </xs:element>
+    <xs:element name="TermName" type="xs:string"/>
+    <xs:element name="TermId" type="xs:string"/>
+  </xs:schema>
+</ct:contentTypeSchema>
+</file>
+
+<file path=customXml/itemProps1.xml><?xml version="1.0" encoding="utf-8"?>
+<ds:datastoreItem xmlns:ds="http://schemas.openxmlformats.org/officeDocument/2006/customXml" ds:itemID="{ED522DCF-C9F6-4760-B253-6881F6612903}">
+  <ds:schemaRefs>
+    <ds:schemaRef ds:uri="0b6bae61-cbc4-483d-b8e2-ea5293709ed7"/>
+    <ds:schemaRef ds:uri="http://purl.org/dc/dcmitype/"/>
+    <ds:schemaRef ds:uri="http://purl.org/dc/elements/1.1/"/>
+    <ds:schemaRef ds:uri="http://purl.org/dc/terms/"/>
+    <ds:schemaRef ds:uri="http://schemas.microsoft.com/office/2006/documentManagement/types"/>
+    <ds:schemaRef ds:uri="http://schemas.microsoft.com/office/2006/metadata/properties"/>
+    <ds:schemaRef ds:uri="http://schemas.microsoft.com/office/infopath/2007/PartnerControls"/>
+    <ds:schemaRef ds:uri="http://schemas.openxmlformats.org/package/2006/metadata/core-properties"/>
+    <ds:schemaRef ds:uri="http://www.w3.org/XML/1998/namespace"/>
+  </ds:schemaRefs>
+</ds:datastoreItem>
+</file>
+
+<file path=customXml/itemProps2.xml><?xml version="1.0" encoding="utf-8"?>
+<ds:datastoreItem xmlns:ds="http://schemas.openxmlformats.org/officeDocument/2006/customXml" ds:itemID="{8D212EEB-9A90-43AC-B62B-D6C41AB94DE4}">
+  <ds:schemaRefs>
+    <ds:schemaRef ds:uri="http://schemas.microsoft.com/sharepoint/v3/contenttype/forms"/>
+  </ds:schemaRefs>
+</ds:datastoreItem>
+</file>
+
+<file path=customXml/itemProps3.xml><?xml version="1.0" encoding="utf-8"?>
+<ds:datastoreItem xmlns:ds="http://schemas.openxmlformats.org/officeDocument/2006/customXml" ds:itemID="{5C293D5B-5FF7-445F-BB00-AB2E8EDA82C3}">
+  <ds:schemaRefs>
+    <ds:schemaRef ds:uri="0b6bae61-cbc4-483d-b8e2-ea5293709ed7"/>
+    <ds:schemaRef ds:uri="http://purl.org/dc/elements/1.1/"/>
+    <ds:schemaRef ds:uri="http://purl.org/dc/terms/"/>
+    <ds:schemaRef ds:uri="http://schemas.microsoft.com/internal/obd"/>
+    <ds:schemaRef ds:uri="http://schemas.microsoft.com/office/2006/documentManagement/types"/>
+    <ds:schemaRef ds:uri="http://schemas.microsoft.com/office/2006/metadata/contentType"/>
+    <ds:schemaRef ds:uri="http://schemas.microsoft.com/office/2006/metadata/properties"/>
+    <ds:schemaRef ds:uri="http://schemas.microsoft.com/office/2006/metadata/properties/metaAttributes"/>
+    <ds:schemaRef ds:uri="http://schemas.microsoft.com/office/infopath/2007/PartnerControls"/>
+    <ds:schemaRef ds:uri="http://schemas.openxmlformats.org/package/2006/metadata/core-properties"/>
+    <ds:schemaRef ds:uri="http://www.w3.org/2001/XMLSchema"/>
+  </ds:schemaRefs>
+</ds:datastoreItem>
 </file>
</xml_diff>